<commit_message>
FINISHED (key features page upgraded, general refactoring)
</commit_message>
<xml_diff>
--- a/slides/01 - Android Introduction.pptx
+++ b/slides/01 - Android Introduction.pptx
@@ -7223,7 +7223,7 @@
         <p:spPr/>
         <p:txBody>
           <a:bodyPr>
-            <a:normAutofit fontScale="92500" lnSpcReduction="10000"/>
+            <a:normAutofit fontScale="92500" lnSpcReduction="20000"/>
           </a:bodyPr>
           <a:lstStyle/>
           <a:p>
@@ -7248,13 +7248,14 @@
           <a:p>
             <a:r>
               <a:rPr lang="en-US" dirty="0"/>
-              <a:t>Free and open-source </a:t>
-            </a:r>
-            <a:r>
-              <a:rPr lang="en-US" dirty="0" err="1"/>
-              <a:t>sotware</a:t>
-            </a:r>
-            <a:endParaRPr lang="en-US" dirty="0"/>
+              <a:t>Low training time</a:t>
+            </a:r>
+          </a:p>
+          <a:p>
+            <a:r>
+              <a:rPr lang="en-US" dirty="0"/>
+              <a:t>Free and open-source software</a:t>
+            </a:r>
           </a:p>
           <a:p>
             <a:pPr lvl="1"/>
@@ -7373,47 +7374,178 @@
             <a:spLocks noGrp="1"/>
           </p:cNvSpPr>
           <p:nvPr>
-            <p:ph idx="1"/>
+            <p:ph sz="half" idx="1"/>
           </p:nvPr>
         </p:nvSpPr>
         <p:spPr/>
         <p:txBody>
           <a:bodyPr>
-            <a:normAutofit/>
+            <a:normAutofit fontScale="85000" lnSpcReduction="20000"/>
           </a:bodyPr>
           <a:lstStyle/>
           <a:p>
-            <a:pPr>
+            <a:pPr algn="just">
               <a:buFont typeface="Arial" panose="020B0604020202020204" pitchFamily="34" charset="0"/>
               <a:buChar char="•"/>
             </a:pPr>
             <a:r>
+              <a:rPr lang="en-GB" dirty="0">
+                <a:solidFill>
+                  <a:srgbClr val="FF0000"/>
+                </a:solidFill>
+              </a:rPr>
+              <a:t>Linux O.S. Kernel:</a:t>
+            </a:r>
+            <a:r>
               <a:rPr lang="en-GB" dirty="0"/>
-              <a:t>Android is based on a Linux Kernel and open source software., It is primarily developed for embedded device (smartphone, tablets, wearable, tv …).</a:t>
-            </a:r>
-          </a:p>
-          <a:p>
-            <a:pPr>
+              <a:t> provide interface with hardware and process control </a:t>
+            </a:r>
+          </a:p>
+          <a:p>
+            <a:pPr algn="just">
               <a:buFont typeface="Arial" panose="020B0604020202020204" pitchFamily="34" charset="0"/>
               <a:buChar char="•"/>
             </a:pPr>
             <a:r>
+              <a:rPr lang="en-GB" dirty="0">
+                <a:solidFill>
+                  <a:srgbClr val="FF0000"/>
+                </a:solidFill>
+              </a:rPr>
+              <a:t>Run time </a:t>
+            </a:r>
+            <a:r>
               <a:rPr lang="en-GB" dirty="0"/>
-              <a:t>Software packages on Android (APK format) are generally distributed through application stores (Google Play Store, …)</a:t>
-            </a:r>
-          </a:p>
-          <a:p>
-            <a:pPr>
+              <a:t>environment (ART): used to execute applications</a:t>
+            </a:r>
+          </a:p>
+          <a:p>
+            <a:pPr marL="0" indent="0" algn="just">
+              <a:buNone/>
+            </a:pPr>
+            <a:r>
+              <a:rPr lang="en-GB" dirty="0"/>
+              <a:t>(Each app runs in a separate process and ART has control on memory and process management, it could stop or kill processes)</a:t>
+            </a:r>
+          </a:p>
+          <a:p>
+            <a:pPr algn="just">
               <a:buFont typeface="Arial" panose="020B0604020202020204" pitchFamily="34" charset="0"/>
               <a:buChar char="•"/>
             </a:pPr>
             <a:r>
+              <a:rPr lang="en-GB" dirty="0">
+                <a:solidFill>
+                  <a:srgbClr val="FF0000"/>
+                </a:solidFill>
+              </a:rPr>
+              <a:t>Open source libraries</a:t>
+            </a:r>
+            <a:r>
               <a:rPr lang="en-GB" dirty="0"/>
-              <a:t>Android OS variant could be developed by everyone but need to implement key features to be easy-use from software developers</a:t>
+              <a:t> for application development</a:t>
+            </a:r>
+          </a:p>
+          <a:p>
+            <a:pPr algn="just">
+              <a:buFont typeface="Arial" panose="020B0604020202020204" pitchFamily="34" charset="0"/>
+              <a:buChar char="•"/>
+            </a:pPr>
+            <a:r>
+              <a:rPr lang="en-GB" dirty="0">
+                <a:solidFill>
+                  <a:srgbClr val="FF0000"/>
+                </a:solidFill>
+              </a:rPr>
+              <a:t>Pre-installed application</a:t>
+            </a:r>
+            <a:r>
+              <a:rPr lang="en-GB" dirty="0"/>
+              <a:t>: phone, SMS, email, browser, calendar, camera, contacts, alarm clock</a:t>
             </a:r>
           </a:p>
           <a:p>
             <a:endParaRPr lang="en-IT" dirty="0"/>
+          </a:p>
+        </p:txBody>
+      </p:sp>
+      <p:sp>
+        <p:nvSpPr>
+          <p:cNvPr id="2" name="Segnaposto contenuto 1">
+            <a:extLst>
+              <a:ext uri="{FF2B5EF4-FFF2-40B4-BE49-F238E27FC236}">
+                <a16:creationId xmlns:a16="http://schemas.microsoft.com/office/drawing/2014/main" id="{1FE7D174-7AE5-4B83-9EDE-55F644650B33}"/>
+              </a:ext>
+            </a:extLst>
+          </p:cNvPr>
+          <p:cNvSpPr>
+            <a:spLocks noGrp="1"/>
+          </p:cNvSpPr>
+          <p:nvPr>
+            <p:ph sz="half" idx="2"/>
+          </p:nvPr>
+        </p:nvSpPr>
+        <p:spPr/>
+        <p:txBody>
+          <a:bodyPr>
+            <a:normAutofit fontScale="85000" lnSpcReduction="20000"/>
+          </a:bodyPr>
+          <a:lstStyle/>
+          <a:p>
+            <a:pPr algn="just"/>
+            <a:r>
+              <a:rPr lang="en-GB" dirty="0">
+                <a:solidFill>
+                  <a:srgbClr val="FF0000"/>
+                </a:solidFill>
+              </a:rPr>
+              <a:t>Software development kit (SDK): </a:t>
+            </a:r>
+            <a:r>
+              <a:rPr lang="en-GB" dirty="0"/>
+              <a:t>used to create app (including IDE and Documentation)</a:t>
+            </a:r>
+          </a:p>
+          <a:p>
+            <a:pPr algn="just"/>
+            <a:r>
+              <a:rPr lang="en-GB" dirty="0"/>
+              <a:t>Application framework to manage system services</a:t>
+            </a:r>
+          </a:p>
+          <a:p>
+            <a:pPr algn="just"/>
+            <a:r>
+              <a:rPr lang="en-GB" dirty="0"/>
+              <a:t>User interface framework</a:t>
+            </a:r>
+          </a:p>
+          <a:p>
+            <a:pPr algn="just"/>
+            <a:r>
+              <a:rPr lang="en-GB" dirty="0">
+                <a:solidFill>
+                  <a:srgbClr val="FF0000"/>
+                </a:solidFill>
+              </a:rPr>
+              <a:t>Compatibility Definition Document </a:t>
+            </a:r>
+            <a:r>
+              <a:rPr lang="en-GB" dirty="0"/>
+              <a:t>(CDD) and </a:t>
+            </a:r>
+            <a:r>
+              <a:rPr lang="en-GB" dirty="0">
+                <a:solidFill>
+                  <a:srgbClr val="FF0000"/>
+                </a:solidFill>
+              </a:rPr>
+              <a:t>Compatibility Test Suite </a:t>
+            </a:r>
+            <a:r>
+              <a:rPr lang="en-GB" dirty="0"/>
+              <a:t>(CTS): describe the resources required for a devis to support android software</a:t>
+            </a:r>
           </a:p>
         </p:txBody>
       </p:sp>
@@ -7881,10 +8013,13 @@
         <p:spPr/>
         <p:txBody>
           <a:bodyPr>
-            <a:normAutofit fontScale="92500" lnSpcReduction="10000"/>
+            <a:normAutofit/>
           </a:bodyPr>
           <a:lstStyle/>
           <a:p>
+            <a:pPr marL="0" indent="0">
+              <a:buNone/>
+            </a:pPr>
             <a:r>
               <a:rPr lang="en-US" dirty="0">
                 <a:solidFill>
@@ -7902,189 +8037,65 @@
           </a:p>
           <a:p>
             <a:r>
+              <a:rPr lang="en-US" dirty="0">
+                <a:solidFill>
+                  <a:srgbClr val="FF0000"/>
+                </a:solidFill>
+              </a:rPr>
+              <a:t>API libraries: </a:t>
+            </a:r>
+            <a:r>
+              <a:rPr lang="it-IT" dirty="0"/>
+              <a:t>one for </a:t>
+            </a:r>
+            <a:r>
               <a:rPr lang="it-IT" dirty="0" err="1"/>
-              <a:t>Android</a:t>
+              <a:t>each</a:t>
             </a:r>
             <a:r>
               <a:rPr lang="it-IT" dirty="0"/>
-              <a:t> </a:t>
+              <a:t> Android </a:t>
             </a:r>
             <a:r>
               <a:rPr lang="it-IT" dirty="0" err="1"/>
-              <a:t>devices</a:t>
+              <a:t>version</a:t>
+            </a:r>
+            <a:endParaRPr lang="en-US" dirty="0">
+              <a:solidFill>
+                <a:srgbClr val="FF0000"/>
+              </a:solidFill>
+            </a:endParaRPr>
+          </a:p>
+          <a:p>
+            <a:r>
+              <a:rPr lang="en-US" dirty="0">
+                <a:solidFill>
+                  <a:srgbClr val="FF0000"/>
+                </a:solidFill>
+              </a:rPr>
+              <a:t>Development tools</a:t>
+            </a:r>
+            <a:r>
+              <a:rPr lang="en-US" dirty="0"/>
+              <a:t>: Android Studio IDE and other tools (</a:t>
             </a:r>
             <a:r>
               <a:rPr lang="it-IT" dirty="0"/>
-              <a:t> </a:t>
-            </a:r>
-            <a:r>
-              <a:rPr lang="it-IT" dirty="0" err="1"/>
-              <a:t>don’t</a:t>
-            </a:r>
-            <a:r>
-              <a:rPr lang="it-IT" dirty="0"/>
-              <a:t> </a:t>
-            </a:r>
-            <a:r>
-              <a:rPr lang="it-IT" dirty="0" err="1"/>
-              <a:t>run</a:t>
-            </a:r>
-            <a:r>
-              <a:rPr lang="it-IT" dirty="0"/>
-              <a:t> </a:t>
-            </a:r>
-            <a:r>
-              <a:rPr lang="it-IT" i="1" dirty="0"/>
-              <a:t>.</a:t>
-            </a:r>
-            <a:r>
-              <a:rPr lang="it-IT" i="1" dirty="0" err="1"/>
-              <a:t>class</a:t>
-            </a:r>
-            <a:r>
-              <a:rPr lang="it-IT" i="1" dirty="0"/>
-              <a:t> </a:t>
-            </a:r>
-            <a:r>
-              <a:rPr lang="it-IT" dirty="0"/>
-              <a:t>and .</a:t>
-            </a:r>
-            <a:r>
-              <a:rPr lang="it-IT" i="1" dirty="0" err="1"/>
-              <a:t>jar</a:t>
-            </a:r>
-            <a:r>
-              <a:rPr lang="it-IT" dirty="0"/>
-              <a:t> </a:t>
-            </a:r>
-            <a:r>
-              <a:rPr lang="it-IT" dirty="0" err="1"/>
-              <a:t>files</a:t>
-            </a:r>
-            <a:r>
-              <a:rPr lang="it-IT" dirty="0"/>
-              <a:t>. To </a:t>
-            </a:r>
-            <a:r>
-              <a:rPr lang="it-IT" dirty="0" err="1"/>
-              <a:t>improve</a:t>
-            </a:r>
-            <a:r>
-              <a:rPr lang="it-IT" dirty="0"/>
-              <a:t> performance, </a:t>
-            </a:r>
-            <a:r>
-              <a:rPr lang="it-IT" dirty="0" err="1"/>
-              <a:t>they</a:t>
-            </a:r>
-            <a:r>
-              <a:rPr lang="it-IT" dirty="0"/>
-              <a:t> use </a:t>
-            </a:r>
-            <a:r>
-              <a:rPr lang="it-IT" dirty="0" err="1"/>
-              <a:t>optimized</a:t>
-            </a:r>
-            <a:r>
-              <a:rPr lang="it-IT" dirty="0"/>
-              <a:t> formats. For </a:t>
-            </a:r>
-            <a:r>
-              <a:rPr lang="it-IT" dirty="0" err="1"/>
-              <a:t>this</a:t>
-            </a:r>
-            <a:r>
-              <a:rPr lang="it-IT" dirty="0"/>
-              <a:t> </a:t>
-            </a:r>
-            <a:r>
-              <a:rPr lang="it-IT" dirty="0" err="1"/>
-              <a:t>reason</a:t>
-            </a:r>
-            <a:r>
-              <a:rPr lang="it-IT" dirty="0"/>
-              <a:t> </a:t>
-            </a:r>
-            <a:r>
-              <a:rPr lang="it-IT" dirty="0" err="1"/>
-              <a:t>you</a:t>
-            </a:r>
-            <a:r>
-              <a:rPr lang="it-IT" dirty="0"/>
-              <a:t> </a:t>
-            </a:r>
-            <a:r>
-              <a:rPr lang="it-IT" dirty="0" err="1"/>
-              <a:t>have</a:t>
-            </a:r>
-            <a:r>
-              <a:rPr lang="it-IT" dirty="0"/>
-              <a:t> to use </a:t>
-            </a:r>
-            <a:r>
-              <a:rPr lang="it-IT" dirty="0" err="1"/>
-              <a:t>Android</a:t>
-            </a:r>
-            <a:r>
-              <a:rPr lang="it-IT" dirty="0"/>
-              <a:t> SDK, </a:t>
-            </a:r>
-            <a:r>
-              <a:rPr lang="it-IT" dirty="0" err="1"/>
-              <a:t>that</a:t>
-            </a:r>
-            <a:r>
-              <a:rPr lang="it-IT" dirty="0"/>
-              <a:t> </a:t>
-            </a:r>
-            <a:r>
-              <a:rPr lang="it-IT" dirty="0" err="1"/>
-              <a:t>inclue</a:t>
-            </a:r>
-            <a:r>
-              <a:rPr lang="it-IT" dirty="0"/>
-              <a:t> </a:t>
-            </a:r>
-            <a:r>
-              <a:rPr lang="it-IT" dirty="0" err="1"/>
-              <a:t>tools</a:t>
-            </a:r>
-            <a:r>
-              <a:rPr lang="it-IT" dirty="0"/>
-              <a:t> to </a:t>
-            </a:r>
-            <a:r>
-              <a:rPr lang="it-IT" dirty="0" err="1"/>
-              <a:t>convert</a:t>
-            </a:r>
-            <a:r>
-              <a:rPr lang="it-IT" dirty="0"/>
-              <a:t> java </a:t>
-            </a:r>
-            <a:r>
-              <a:rPr lang="it-IT" dirty="0" err="1"/>
-              <a:t>compiled</a:t>
-            </a:r>
-            <a:r>
-              <a:rPr lang="it-IT" dirty="0"/>
-              <a:t> code </a:t>
-            </a:r>
-            <a:r>
-              <a:rPr lang="it-IT" dirty="0" err="1"/>
-              <a:t>into</a:t>
-            </a:r>
-            <a:r>
-              <a:rPr lang="it-IT" dirty="0"/>
-              <a:t> </a:t>
-            </a:r>
-            <a:r>
-              <a:rPr lang="it-IT" dirty="0" err="1"/>
-              <a:t>Android</a:t>
-            </a:r>
-            <a:r>
-              <a:rPr lang="it-IT" dirty="0"/>
-              <a:t> format</a:t>
-            </a:r>
+              <a:t>debugger, design tools…)</a:t>
+            </a:r>
+          </a:p>
+          <a:p>
+            <a:r>
+              <a:rPr lang="it-IT" dirty="0">
+                <a:solidFill>
+                  <a:srgbClr val="FF0000"/>
+                </a:solidFill>
+              </a:rPr>
+              <a:t>Android Virtual Device Manager</a:t>
+            </a:r>
+          </a:p>
+          <a:p>
+            <a:endParaRPr lang="en-US" dirty="0"/>
           </a:p>
           <a:p>
             <a:endParaRPr lang="it-IT" dirty="0"/>
@@ -8113,9 +8124,44 @@
         <p:spPr/>
         <p:txBody>
           <a:bodyPr>
-            <a:normAutofit fontScale="92500" lnSpcReduction="10000"/>
+            <a:normAutofit/>
           </a:bodyPr>
           <a:lstStyle/>
+          <a:p>
+            <a:pPr marL="0" indent="0">
+              <a:buNone/>
+            </a:pPr>
+            <a:endParaRPr lang="it-IT" dirty="0">
+              <a:solidFill>
+                <a:schemeClr val="accent6">
+                  <a:lumMod val="75000"/>
+                </a:schemeClr>
+              </a:solidFill>
+            </a:endParaRPr>
+          </a:p>
+          <a:p>
+            <a:r>
+              <a:rPr lang="it-IT" dirty="0">
+                <a:solidFill>
+                  <a:srgbClr val="FF0000"/>
+                </a:solidFill>
+              </a:rPr>
+              <a:t>Emulator: </a:t>
+            </a:r>
+            <a:r>
+              <a:rPr lang="it-IT" dirty="0" err="1"/>
+              <a:t>run</a:t>
+            </a:r>
+            <a:r>
+              <a:rPr lang="it-IT" dirty="0"/>
+              <a:t> in AVD</a:t>
+            </a:r>
+            <a:endParaRPr lang="it-IT" dirty="0">
+              <a:solidFill>
+                <a:srgbClr val="FF0000"/>
+              </a:solidFill>
+            </a:endParaRPr>
+          </a:p>
           <a:p>
             <a:r>
               <a:rPr lang="it-IT" dirty="0">
@@ -8125,33 +8171,15 @@
                   </a:schemeClr>
                 </a:solidFill>
               </a:rPr>
-              <a:t>SDK </a:t>
-            </a:r>
-            <a:r>
-              <a:rPr lang="it-IT" dirty="0" err="1">
-                <a:solidFill>
-                  <a:schemeClr val="accent6">
-                    <a:lumMod val="75000"/>
-                  </a:schemeClr>
-                </a:solidFill>
-              </a:rPr>
-              <a:t>platform</a:t>
+              <a:t>Android support</a:t>
             </a:r>
             <a:r>
               <a:rPr lang="it-IT" dirty="0"/>
-              <a:t>: </a:t>
+              <a:t>: extra </a:t>
             </a:r>
             <a:r>
               <a:rPr lang="it-IT" dirty="0" err="1"/>
-              <a:t>one</a:t>
-            </a:r>
-            <a:r>
-              <a:rPr lang="it-IT" dirty="0"/>
-              <a:t> for </a:t>
-            </a:r>
-            <a:r>
-              <a:rPr lang="it-IT" dirty="0" err="1"/>
-              <a:t>each</a:t>
+              <a:t>APIs</a:t>
             </a:r>
             <a:r>
               <a:rPr lang="it-IT" dirty="0"/>
@@ -8159,7 +8187,7 @@
             </a:r>
             <a:r>
               <a:rPr lang="it-IT" dirty="0" err="1"/>
-              <a:t>Android</a:t>
+              <a:t>that</a:t>
             </a:r>
             <a:r>
               <a:rPr lang="it-IT" dirty="0"/>
@@ -8167,21 +8195,27 @@
             </a:r>
             <a:r>
               <a:rPr lang="it-IT" dirty="0" err="1"/>
-              <a:t>version</a:t>
+              <a:t>aren’t</a:t>
+            </a:r>
+            <a:r>
+              <a:rPr lang="it-IT" dirty="0"/>
+              <a:t> </a:t>
+            </a:r>
+            <a:r>
+              <a:rPr lang="it-IT" dirty="0" err="1"/>
+              <a:t>available</a:t>
+            </a:r>
+            <a:r>
+              <a:rPr lang="it-IT" dirty="0"/>
+              <a:t> in standard </a:t>
+            </a:r>
+            <a:r>
+              <a:rPr lang="it-IT" dirty="0" err="1"/>
+              <a:t>platform</a:t>
             </a:r>
             <a:endParaRPr lang="it-IT" dirty="0"/>
           </a:p>
           <a:p>
-            <a:r>
-              <a:rPr lang="it-IT" dirty="0" err="1">
-                <a:solidFill>
-                  <a:schemeClr val="accent6">
-                    <a:lumMod val="75000"/>
-                  </a:schemeClr>
-                </a:solidFill>
-              </a:rPr>
-              <a:t>Android</a:t>
-            </a:r>
             <a:r>
               <a:rPr lang="it-IT" dirty="0">
                 <a:solidFill>
@@ -8190,174 +8224,7 @@
                   </a:schemeClr>
                 </a:solidFill>
               </a:rPr>
-              <a:t> </a:t>
-            </a:r>
-            <a:r>
-              <a:rPr lang="it-IT" dirty="0" err="1">
-                <a:solidFill>
-                  <a:schemeClr val="accent6">
-                    <a:lumMod val="75000"/>
-                  </a:schemeClr>
-                </a:solidFill>
-              </a:rPr>
-              <a:t>support</a:t>
-            </a:r>
-            <a:r>
-              <a:rPr lang="it-IT" dirty="0"/>
-              <a:t>: extra </a:t>
-            </a:r>
-            <a:r>
-              <a:rPr lang="it-IT" dirty="0" err="1"/>
-              <a:t>APIs</a:t>
-            </a:r>
-            <a:r>
-              <a:rPr lang="it-IT" dirty="0"/>
-              <a:t> </a:t>
-            </a:r>
-            <a:r>
-              <a:rPr lang="it-IT" dirty="0" err="1"/>
-              <a:t>that</a:t>
-            </a:r>
-            <a:r>
-              <a:rPr lang="it-IT" dirty="0"/>
-              <a:t> </a:t>
-            </a:r>
-            <a:r>
-              <a:rPr lang="it-IT" dirty="0" err="1"/>
-              <a:t>aren’t</a:t>
-            </a:r>
-            <a:r>
-              <a:rPr lang="it-IT" dirty="0"/>
-              <a:t> </a:t>
-            </a:r>
-            <a:r>
-              <a:rPr lang="it-IT" dirty="0" err="1"/>
-              <a:t>available</a:t>
-            </a:r>
-            <a:r>
-              <a:rPr lang="it-IT" dirty="0"/>
-              <a:t> in standard </a:t>
-            </a:r>
-            <a:r>
-              <a:rPr lang="it-IT" dirty="0" err="1"/>
-              <a:t>platform</a:t>
-            </a:r>
-            <a:endParaRPr lang="it-IT" dirty="0"/>
-          </a:p>
-          <a:p>
-            <a:r>
-              <a:rPr lang="it-IT" dirty="0">
-                <a:solidFill>
-                  <a:schemeClr val="accent6">
-                    <a:lumMod val="75000"/>
-                  </a:schemeClr>
-                </a:solidFill>
-              </a:rPr>
-              <a:t>SDK </a:t>
-            </a:r>
-            <a:r>
-              <a:rPr lang="it-IT" dirty="0" err="1">
-                <a:solidFill>
-                  <a:schemeClr val="accent6">
-                    <a:lumMod val="75000"/>
-                  </a:schemeClr>
-                </a:solidFill>
-              </a:rPr>
-              <a:t>tools</a:t>
-            </a:r>
-            <a:r>
-              <a:rPr lang="it-IT" dirty="0">
-                <a:solidFill>
-                  <a:schemeClr val="accent6">
-                    <a:lumMod val="75000"/>
-                  </a:schemeClr>
-                </a:solidFill>
-              </a:rPr>
-              <a:t>: </a:t>
-            </a:r>
-            <a:r>
-              <a:rPr lang="it-IT" dirty="0"/>
-              <a:t>emulator, </a:t>
-            </a:r>
-            <a:r>
-              <a:rPr lang="it-IT" dirty="0" err="1"/>
-              <a:t>debugger</a:t>
-            </a:r>
-            <a:r>
-              <a:rPr lang="it-IT" dirty="0"/>
-              <a:t>, design </a:t>
-            </a:r>
-            <a:r>
-              <a:rPr lang="it-IT" dirty="0" err="1"/>
-              <a:t>tools</a:t>
-            </a:r>
-            <a:r>
-              <a:rPr lang="it-IT" dirty="0"/>
-              <a:t>…</a:t>
-            </a:r>
-          </a:p>
-          <a:p>
-            <a:r>
-              <a:rPr lang="it-IT" dirty="0" err="1">
-                <a:solidFill>
-                  <a:schemeClr val="accent6">
-                    <a:lumMod val="75000"/>
-                  </a:schemeClr>
-                </a:solidFill>
-              </a:rPr>
-              <a:t>Documentation</a:t>
-            </a:r>
-            <a:r>
-              <a:rPr lang="it-IT" dirty="0"/>
-              <a:t>: </a:t>
-            </a:r>
-            <a:r>
-              <a:rPr lang="it-IT" dirty="0" err="1"/>
-              <a:t>access</a:t>
-            </a:r>
-            <a:r>
-              <a:rPr lang="it-IT" dirty="0"/>
-              <a:t> API </a:t>
-            </a:r>
-            <a:r>
-              <a:rPr lang="it-IT" dirty="0" err="1"/>
-              <a:t>documentation</a:t>
-            </a:r>
-            <a:r>
-              <a:rPr lang="it-IT" dirty="0"/>
-              <a:t> offline</a:t>
-            </a:r>
-          </a:p>
-          <a:p>
-            <a:r>
-              <a:rPr lang="it-IT" dirty="0">
-                <a:solidFill>
-                  <a:schemeClr val="accent6">
-                    <a:lumMod val="75000"/>
-                  </a:schemeClr>
-                </a:solidFill>
-              </a:rPr>
-              <a:t>Sample </a:t>
-            </a:r>
-            <a:r>
-              <a:rPr lang="it-IT" dirty="0" err="1">
-                <a:solidFill>
-                  <a:schemeClr val="accent6">
-                    <a:lumMod val="75000"/>
-                  </a:schemeClr>
-                </a:solidFill>
-              </a:rPr>
-              <a:t>apps</a:t>
-            </a:r>
-            <a:r>
-              <a:rPr lang="it-IT" dirty="0">
-                <a:solidFill>
-                  <a:schemeClr val="accent6">
-                    <a:lumMod val="75000"/>
-                  </a:schemeClr>
-                </a:solidFill>
-              </a:rPr>
-              <a:t>:  </a:t>
+              <a:t>Sample apps:  </a:t>
             </a:r>
             <a:r>
               <a:rPr lang="it-IT" dirty="0" err="1"/>
@@ -8530,13 +8397,142 @@
         </p:nvSpPr>
         <p:spPr/>
         <p:txBody>
-          <a:bodyPr/>
+          <a:bodyPr>
+            <a:normAutofit fontScale="85000" lnSpcReduction="20000"/>
+          </a:bodyPr>
           <a:lstStyle/>
           <a:p>
             <a:r>
               <a:rPr lang="en-US" dirty="0"/>
               <a:t>Android doesn’t use JVM but use a special VM called DALVIK.</a:t>
             </a:r>
+          </a:p>
+          <a:p>
+            <a:r>
+              <a:rPr lang="it-IT" dirty="0"/>
+              <a:t>Android devices </a:t>
+            </a:r>
+            <a:r>
+              <a:rPr lang="it-IT" dirty="0" err="1"/>
+              <a:t>don’t</a:t>
+            </a:r>
+            <a:r>
+              <a:rPr lang="it-IT" dirty="0"/>
+              <a:t> </a:t>
+            </a:r>
+            <a:r>
+              <a:rPr lang="it-IT" dirty="0" err="1"/>
+              <a:t>run</a:t>
+            </a:r>
+            <a:r>
+              <a:rPr lang="it-IT" dirty="0"/>
+              <a:t> </a:t>
+            </a:r>
+            <a:r>
+              <a:rPr lang="it-IT" i="1" dirty="0"/>
+              <a:t>.class </a:t>
+            </a:r>
+            <a:r>
+              <a:rPr lang="it-IT" dirty="0"/>
+              <a:t>and .</a:t>
+            </a:r>
+            <a:r>
+              <a:rPr lang="it-IT" i="1" dirty="0" err="1"/>
+              <a:t>jar</a:t>
+            </a:r>
+            <a:r>
+              <a:rPr lang="it-IT" dirty="0"/>
+              <a:t> files. To </a:t>
+            </a:r>
+            <a:r>
+              <a:rPr lang="it-IT" dirty="0" err="1"/>
+              <a:t>improve</a:t>
+            </a:r>
+            <a:r>
+              <a:rPr lang="it-IT" dirty="0"/>
+              <a:t> performance, </a:t>
+            </a:r>
+            <a:r>
+              <a:rPr lang="it-IT" dirty="0" err="1"/>
+              <a:t>they</a:t>
+            </a:r>
+            <a:r>
+              <a:rPr lang="it-IT" dirty="0"/>
+              <a:t> use </a:t>
+            </a:r>
+            <a:r>
+              <a:rPr lang="it-IT" dirty="0" err="1"/>
+              <a:t>optimized</a:t>
+            </a:r>
+            <a:r>
+              <a:rPr lang="it-IT" dirty="0"/>
+              <a:t> formats. For </a:t>
+            </a:r>
+            <a:r>
+              <a:rPr lang="it-IT" dirty="0" err="1"/>
+              <a:t>this</a:t>
+            </a:r>
+            <a:r>
+              <a:rPr lang="it-IT" dirty="0"/>
+              <a:t> </a:t>
+            </a:r>
+            <a:r>
+              <a:rPr lang="it-IT" dirty="0" err="1"/>
+              <a:t>reason</a:t>
+            </a:r>
+            <a:r>
+              <a:rPr lang="it-IT" dirty="0"/>
+              <a:t> </a:t>
+            </a:r>
+            <a:r>
+              <a:rPr lang="it-IT" dirty="0" err="1"/>
+              <a:t>you</a:t>
+            </a:r>
+            <a:r>
+              <a:rPr lang="it-IT" dirty="0"/>
+              <a:t> </a:t>
+            </a:r>
+            <a:r>
+              <a:rPr lang="it-IT" dirty="0" err="1"/>
+              <a:t>have</a:t>
+            </a:r>
+            <a:r>
+              <a:rPr lang="it-IT" dirty="0"/>
+              <a:t> to use Android SDK, </a:t>
+            </a:r>
+            <a:r>
+              <a:rPr lang="it-IT" dirty="0" err="1"/>
+              <a:t>that</a:t>
+            </a:r>
+            <a:r>
+              <a:rPr lang="it-IT" dirty="0"/>
+              <a:t> include tools to </a:t>
+            </a:r>
+            <a:r>
+              <a:rPr lang="it-IT" dirty="0" err="1"/>
+              <a:t>convert</a:t>
+            </a:r>
+            <a:r>
+              <a:rPr lang="it-IT" dirty="0"/>
+              <a:t> java </a:t>
+            </a:r>
+            <a:r>
+              <a:rPr lang="it-IT" dirty="0" err="1"/>
+              <a:t>compiled</a:t>
+            </a:r>
+            <a:r>
+              <a:rPr lang="it-IT" dirty="0"/>
+              <a:t> code </a:t>
+            </a:r>
+            <a:r>
+              <a:rPr lang="it-IT" dirty="0" err="1"/>
+              <a:t>into</a:t>
+            </a:r>
+            <a:r>
+              <a:rPr lang="it-IT" dirty="0"/>
+              <a:t> Android format</a:t>
+            </a:r>
+            <a:endParaRPr lang="en-US" dirty="0"/>
           </a:p>
           <a:p>
             <a:r>

</xml_diff>

<commit_message>
M1 -> COMPLETED (add android libraries and adroid framework)
</commit_message>
<xml_diff>
--- a/slides/01 - Android Introduction.pptx
+++ b/slides/01 - Android Introduction.pptx
@@ -11,8 +11,10 @@
     <p:sldId id="264" r:id="rId5"/>
     <p:sldId id="263" r:id="rId6"/>
     <p:sldId id="265" r:id="rId7"/>
-    <p:sldId id="271" r:id="rId8"/>
+    <p:sldId id="272" r:id="rId8"/>
     <p:sldId id="270" r:id="rId9"/>
+    <p:sldId id="271" r:id="rId10"/>
+    <p:sldId id="274" r:id="rId11"/>
   </p:sldIdLst>
   <p:sldSz cx="12192000" cy="6858000"/>
   <p:notesSz cx="6858000" cy="9144000"/>
@@ -128,6 +130,229 @@
     </p:ext>
   </p:extLst>
 </p:presentation>
+</file>
+
+<file path=ppt/revisionInfo.xml><?xml version="1.0" encoding="utf-8"?>
+<p1510:revInfo xmlns:a="http://schemas.openxmlformats.org/drawingml/2006/main" xmlns:r="http://schemas.openxmlformats.org/officeDocument/2006/relationships" xmlns:p1510="http://schemas.microsoft.com/office/powerpoint/2015/10/main">
+  <p1510:revLst>
+    <p1510:client id="{45976A04-9547-49A1-98B8-D239308FE1AF}" v="8" dt="2021-12-29T16:10:16.081"/>
+  </p1510:revLst>
+</p1510:revInfo>
+</file>
+
+<file path=ppt/changesInfos/changesInfo1.xml><?xml version="1.0" encoding="utf-8"?>
+<pc:chgInfo xmlns:a="http://schemas.openxmlformats.org/drawingml/2006/main" xmlns:r="http://schemas.openxmlformats.org/officeDocument/2006/relationships" xmlns:ac="http://schemas.microsoft.com/office/drawing/2013/main/command" xmlns:pc="http://schemas.microsoft.com/office/powerpoint/2013/main/command">
+  <pc:docChgLst>
+    <pc:chgData name="KEVIN MALAGOLI" userId="4753276f-5182-4cb6-86cf-6602de7c63db" providerId="ADAL" clId="{45976A04-9547-49A1-98B8-D239308FE1AF}"/>
+    <pc:docChg chg="undo custSel addSld delSld modSld sldOrd">
+      <pc:chgData name="KEVIN MALAGOLI" userId="4753276f-5182-4cb6-86cf-6602de7c63db" providerId="ADAL" clId="{45976A04-9547-49A1-98B8-D239308FE1AF}" dt="2021-12-29T16:21:53.586" v="1089" actId="20577"/>
+      <pc:docMkLst>
+        <pc:docMk/>
+      </pc:docMkLst>
+      <pc:sldChg chg="modSp mod">
+        <pc:chgData name="KEVIN MALAGOLI" userId="4753276f-5182-4cb6-86cf-6602de7c63db" providerId="ADAL" clId="{45976A04-9547-49A1-98B8-D239308FE1AF}" dt="2021-12-29T13:56:59.245" v="104" actId="207"/>
+        <pc:sldMkLst>
+          <pc:docMk/>
+          <pc:sldMk cId="333887588" sldId="263"/>
+        </pc:sldMkLst>
+        <pc:spChg chg="mod">
+          <ac:chgData name="KEVIN MALAGOLI" userId="4753276f-5182-4cb6-86cf-6602de7c63db" providerId="ADAL" clId="{45976A04-9547-49A1-98B8-D239308FE1AF}" dt="2021-12-29T13:56:59.245" v="104" actId="207"/>
+          <ac:spMkLst>
+            <pc:docMk/>
+            <pc:sldMk cId="333887588" sldId="263"/>
+            <ac:spMk id="2" creationId="{1FE7D174-7AE5-4B83-9EDE-55F644650B33}"/>
+          </ac:spMkLst>
+        </pc:spChg>
+      </pc:sldChg>
+      <pc:sldChg chg="addSp delSp modSp mod modClrScheme chgLayout">
+        <pc:chgData name="KEVIN MALAGOLI" userId="4753276f-5182-4cb6-86cf-6602de7c63db" providerId="ADAL" clId="{45976A04-9547-49A1-98B8-D239308FE1AF}" dt="2021-12-29T14:12:14.634" v="265" actId="700"/>
+        <pc:sldMkLst>
+          <pc:docMk/>
+          <pc:sldMk cId="1670668431" sldId="265"/>
+        </pc:sldMkLst>
+        <pc:spChg chg="add del mod">
+          <ac:chgData name="KEVIN MALAGOLI" userId="4753276f-5182-4cb6-86cf-6602de7c63db" providerId="ADAL" clId="{45976A04-9547-49A1-98B8-D239308FE1AF}" dt="2021-12-29T13:54:48.549" v="26" actId="478"/>
+          <ac:spMkLst>
+            <pc:docMk/>
+            <pc:sldMk cId="1670668431" sldId="265"/>
+            <ac:spMk id="2" creationId="{F63AC4EE-1845-453F-8249-D50AF1713387}"/>
+          </ac:spMkLst>
+        </pc:spChg>
+        <pc:spChg chg="mod ord">
+          <ac:chgData name="KEVIN MALAGOLI" userId="4753276f-5182-4cb6-86cf-6602de7c63db" providerId="ADAL" clId="{45976A04-9547-49A1-98B8-D239308FE1AF}" dt="2021-12-29T14:12:14.634" v="265" actId="700"/>
+          <ac:spMkLst>
+            <pc:docMk/>
+            <pc:sldMk cId="1670668431" sldId="265"/>
+            <ac:spMk id="3" creationId="{411E66E4-AC64-D845-BAF2-8F3BA87C57C9}"/>
+          </ac:spMkLst>
+        </pc:spChg>
+        <pc:spChg chg="mod ord">
+          <ac:chgData name="KEVIN MALAGOLI" userId="4753276f-5182-4cb6-86cf-6602de7c63db" providerId="ADAL" clId="{45976A04-9547-49A1-98B8-D239308FE1AF}" dt="2021-12-29T14:12:14.634" v="265" actId="700"/>
+          <ac:spMkLst>
+            <pc:docMk/>
+            <pc:sldMk cId="1670668431" sldId="265"/>
+            <ac:spMk id="4" creationId="{562C0DD1-C1B6-4C6D-B4FA-33FB9F82C2F2}"/>
+          </ac:spMkLst>
+        </pc:spChg>
+        <pc:spChg chg="mod ord">
+          <ac:chgData name="KEVIN MALAGOLI" userId="4753276f-5182-4cb6-86cf-6602de7c63db" providerId="ADAL" clId="{45976A04-9547-49A1-98B8-D239308FE1AF}" dt="2021-12-29T14:12:14.634" v="265" actId="700"/>
+          <ac:spMkLst>
+            <pc:docMk/>
+            <pc:sldMk cId="1670668431" sldId="265"/>
+            <ac:spMk id="71" creationId="{3081276C-A61E-4601-BBB5-57FC399E95F9}"/>
+          </ac:spMkLst>
+        </pc:spChg>
+        <pc:picChg chg="add del mod ord">
+          <ac:chgData name="KEVIN MALAGOLI" userId="4753276f-5182-4cb6-86cf-6602de7c63db" providerId="ADAL" clId="{45976A04-9547-49A1-98B8-D239308FE1AF}" dt="2021-12-29T14:12:14.634" v="265" actId="700"/>
+          <ac:picMkLst>
+            <pc:docMk/>
+            <pc:sldMk cId="1670668431" sldId="265"/>
+            <ac:picMk id="9" creationId="{5207C27C-FAC7-624C-9CF8-55F9F949FEFF}"/>
+          </ac:picMkLst>
+        </pc:picChg>
+        <pc:picChg chg="add del mod">
+          <ac:chgData name="KEVIN MALAGOLI" userId="4753276f-5182-4cb6-86cf-6602de7c63db" providerId="ADAL" clId="{45976A04-9547-49A1-98B8-D239308FE1AF}" dt="2021-12-29T13:54:48.027" v="25"/>
+          <ac:picMkLst>
+            <pc:docMk/>
+            <pc:sldMk cId="1670668431" sldId="265"/>
+            <ac:picMk id="2050" creationId="{13B8A1D3-DBDF-4433-8C43-1F52FD7AA2D0}"/>
+          </ac:picMkLst>
+        </pc:picChg>
+      </pc:sldChg>
+      <pc:sldChg chg="modSp mod ord">
+        <pc:chgData name="KEVIN MALAGOLI" userId="4753276f-5182-4cb6-86cf-6602de7c63db" providerId="ADAL" clId="{45976A04-9547-49A1-98B8-D239308FE1AF}" dt="2021-12-29T16:20:34.420" v="1068"/>
+        <pc:sldMkLst>
+          <pc:docMk/>
+          <pc:sldMk cId="3196813027" sldId="270"/>
+        </pc:sldMkLst>
+        <pc:spChg chg="mod">
+          <ac:chgData name="KEVIN MALAGOLI" userId="4753276f-5182-4cb6-86cf-6602de7c63db" providerId="ADAL" clId="{45976A04-9547-49A1-98B8-D239308FE1AF}" dt="2021-12-29T16:02:34.920" v="910" actId="27636"/>
+          <ac:spMkLst>
+            <pc:docMk/>
+            <pc:sldMk cId="3196813027" sldId="270"/>
+            <ac:spMk id="12" creationId="{91C05C0F-14DA-40BC-B82E-2197126E014F}"/>
+          </ac:spMkLst>
+        </pc:spChg>
+      </pc:sldChg>
+      <pc:sldChg chg="ord">
+        <pc:chgData name="KEVIN MALAGOLI" userId="4753276f-5182-4cb6-86cf-6602de7c63db" providerId="ADAL" clId="{45976A04-9547-49A1-98B8-D239308FE1AF}" dt="2021-12-29T16:19:55.575" v="1064"/>
+        <pc:sldMkLst>
+          <pc:docMk/>
+          <pc:sldMk cId="2085951726" sldId="271"/>
+        </pc:sldMkLst>
+      </pc:sldChg>
+      <pc:sldChg chg="addSp delSp modSp new mod ord">
+        <pc:chgData name="KEVIN MALAGOLI" userId="4753276f-5182-4cb6-86cf-6602de7c63db" providerId="ADAL" clId="{45976A04-9547-49A1-98B8-D239308FE1AF}" dt="2021-12-29T16:21:53.586" v="1089" actId="20577"/>
+        <pc:sldMkLst>
+          <pc:docMk/>
+          <pc:sldMk cId="815546248" sldId="272"/>
+        </pc:sldMkLst>
+        <pc:spChg chg="mod">
+          <ac:chgData name="KEVIN MALAGOLI" userId="4753276f-5182-4cb6-86cf-6602de7c63db" providerId="ADAL" clId="{45976A04-9547-49A1-98B8-D239308FE1AF}" dt="2021-12-29T13:53:33.134" v="17" actId="20577"/>
+          <ac:spMkLst>
+            <pc:docMk/>
+            <pc:sldMk cId="815546248" sldId="272"/>
+            <ac:spMk id="2" creationId="{2E962A39-C5AD-4FD5-867E-856E3327BE72}"/>
+          </ac:spMkLst>
+        </pc:spChg>
+        <pc:spChg chg="mod">
+          <ac:chgData name="KEVIN MALAGOLI" userId="4753276f-5182-4cb6-86cf-6602de7c63db" providerId="ADAL" clId="{45976A04-9547-49A1-98B8-D239308FE1AF}" dt="2021-12-29T16:20:50.799" v="1071" actId="20577"/>
+          <ac:spMkLst>
+            <pc:docMk/>
+            <pc:sldMk cId="815546248" sldId="272"/>
+            <ac:spMk id="3" creationId="{6A5B8ABA-B84A-4959-B86C-6F5E092E505E}"/>
+          </ac:spMkLst>
+        </pc:spChg>
+        <pc:spChg chg="del">
+          <ac:chgData name="KEVIN MALAGOLI" userId="4753276f-5182-4cb6-86cf-6602de7c63db" providerId="ADAL" clId="{45976A04-9547-49A1-98B8-D239308FE1AF}" dt="2021-12-29T13:53:37.936" v="18"/>
+          <ac:spMkLst>
+            <pc:docMk/>
+            <pc:sldMk cId="815546248" sldId="272"/>
+            <ac:spMk id="4" creationId="{C9331A12-5393-4198-B861-41D254ADA97C}"/>
+          </ac:spMkLst>
+        </pc:spChg>
+        <pc:spChg chg="add mod">
+          <ac:chgData name="KEVIN MALAGOLI" userId="4753276f-5182-4cb6-86cf-6602de7c63db" providerId="ADAL" clId="{45976A04-9547-49A1-98B8-D239308FE1AF}" dt="2021-12-29T16:21:53.586" v="1089" actId="20577"/>
+          <ac:spMkLst>
+            <pc:docMk/>
+            <pc:sldMk cId="815546248" sldId="272"/>
+            <ac:spMk id="6" creationId="{2B9996C9-7459-41DA-BF1C-7A91261E21FF}"/>
+          </ac:spMkLst>
+        </pc:spChg>
+        <pc:picChg chg="add del mod">
+          <ac:chgData name="KEVIN MALAGOLI" userId="4753276f-5182-4cb6-86cf-6602de7c63db" providerId="ADAL" clId="{45976A04-9547-49A1-98B8-D239308FE1AF}" dt="2021-12-29T16:10:16.081" v="911" actId="478"/>
+          <ac:picMkLst>
+            <pc:docMk/>
+            <pc:sldMk cId="815546248" sldId="272"/>
+            <ac:picMk id="1026" creationId="{32BF2FBB-C414-44C3-9544-091C6DDEFAAF}"/>
+          </ac:picMkLst>
+        </pc:picChg>
+      </pc:sldChg>
+      <pc:sldChg chg="modSp new del mod">
+        <pc:chgData name="KEVIN MALAGOLI" userId="4753276f-5182-4cb6-86cf-6602de7c63db" providerId="ADAL" clId="{45976A04-9547-49A1-98B8-D239308FE1AF}" dt="2021-12-29T14:56:57.625" v="675" actId="47"/>
+        <pc:sldMkLst>
+          <pc:docMk/>
+          <pc:sldMk cId="3122075574" sldId="273"/>
+        </pc:sldMkLst>
+        <pc:spChg chg="mod">
+          <ac:chgData name="KEVIN MALAGOLI" userId="4753276f-5182-4cb6-86cf-6602de7c63db" providerId="ADAL" clId="{45976A04-9547-49A1-98B8-D239308FE1AF}" dt="2021-12-29T14:12:28.424" v="296" actId="20577"/>
+          <ac:spMkLst>
+            <pc:docMk/>
+            <pc:sldMk cId="3122075574" sldId="273"/>
+            <ac:spMk id="2" creationId="{4A494961-2726-4539-A126-E72A9BCC3511}"/>
+          </ac:spMkLst>
+        </pc:spChg>
+        <pc:spChg chg="mod">
+          <ac:chgData name="KEVIN MALAGOLI" userId="4753276f-5182-4cb6-86cf-6602de7c63db" providerId="ADAL" clId="{45976A04-9547-49A1-98B8-D239308FE1AF}" dt="2021-12-29T14:34:55.986" v="620" actId="27636"/>
+          <ac:spMkLst>
+            <pc:docMk/>
+            <pc:sldMk cId="3122075574" sldId="273"/>
+            <ac:spMk id="3" creationId="{1A94EAB8-B4ED-482B-BF18-37B07E519AC4}"/>
+          </ac:spMkLst>
+        </pc:spChg>
+        <pc:spChg chg="mod">
+          <ac:chgData name="KEVIN MALAGOLI" userId="4753276f-5182-4cb6-86cf-6602de7c63db" providerId="ADAL" clId="{45976A04-9547-49A1-98B8-D239308FE1AF}" dt="2021-12-29T14:34:55.986" v="621" actId="27636"/>
+          <ac:spMkLst>
+            <pc:docMk/>
+            <pc:sldMk cId="3122075574" sldId="273"/>
+            <ac:spMk id="4" creationId="{609A1AEC-9B08-4B30-8D46-4F1C8B8A8648}"/>
+          </ac:spMkLst>
+        </pc:spChg>
+      </pc:sldChg>
+      <pc:sldChg chg="modSp new mod">
+        <pc:chgData name="KEVIN MALAGOLI" userId="4753276f-5182-4cb6-86cf-6602de7c63db" providerId="ADAL" clId="{45976A04-9547-49A1-98B8-D239308FE1AF}" dt="2021-12-29T16:00:30.912" v="901" actId="403"/>
+        <pc:sldMkLst>
+          <pc:docMk/>
+          <pc:sldMk cId="104112507" sldId="274"/>
+        </pc:sldMkLst>
+        <pc:spChg chg="mod">
+          <ac:chgData name="KEVIN MALAGOLI" userId="4753276f-5182-4cb6-86cf-6602de7c63db" providerId="ADAL" clId="{45976A04-9547-49A1-98B8-D239308FE1AF}" dt="2021-12-29T14:36:32.398" v="674" actId="20577"/>
+          <ac:spMkLst>
+            <pc:docMk/>
+            <pc:sldMk cId="104112507" sldId="274"/>
+            <ac:spMk id="2" creationId="{7ED17C10-5160-4D24-9C1C-8B84D953BC5D}"/>
+          </ac:spMkLst>
+        </pc:spChg>
+        <pc:spChg chg="mod">
+          <ac:chgData name="KEVIN MALAGOLI" userId="4753276f-5182-4cb6-86cf-6602de7c63db" providerId="ADAL" clId="{45976A04-9547-49A1-98B8-D239308FE1AF}" dt="2021-12-29T16:00:27.225" v="900" actId="403"/>
+          <ac:spMkLst>
+            <pc:docMk/>
+            <pc:sldMk cId="104112507" sldId="274"/>
+            <ac:spMk id="3" creationId="{93EF6A8C-658C-42D9-BA88-A461BB9BA118}"/>
+          </ac:spMkLst>
+        </pc:spChg>
+        <pc:spChg chg="mod">
+          <ac:chgData name="KEVIN MALAGOLI" userId="4753276f-5182-4cb6-86cf-6602de7c63db" providerId="ADAL" clId="{45976A04-9547-49A1-98B8-D239308FE1AF}" dt="2021-12-29T16:00:30.912" v="901" actId="403"/>
+          <ac:spMkLst>
+            <pc:docMk/>
+            <pc:sldMk cId="104112507" sldId="274"/>
+            <ac:spMk id="4" creationId="{E3D9853D-E8E0-4CB4-A310-B5029BC8939E}"/>
+          </ac:spMkLst>
+        </pc:spChg>
+      </pc:sldChg>
+    </pc:docChg>
+  </pc:docChgLst>
+</pc:chgInfo>
 </file>
 
 <file path=ppt/slideLayouts/slideLayout1.xml><?xml version="1.0" encoding="utf-8"?>
@@ -3120,6 +3345,420 @@
     <p:extLst>
       <p:ext uri="{BB962C8B-B14F-4D97-AF65-F5344CB8AC3E}">
         <p14:creationId xmlns:p14="http://schemas.microsoft.com/office/powerpoint/2010/main" val="3439994379"/>
+      </p:ext>
+    </p:extLst>
+  </p:cSld>
+  <p:clrMapOvr>
+    <a:masterClrMapping/>
+  </p:clrMapOvr>
+</p:sld>
+</file>
+
+<file path=ppt/slides/slide10.xml><?xml version="1.0" encoding="utf-8"?>
+<p:sld xmlns:a="http://schemas.openxmlformats.org/drawingml/2006/main" xmlns:r="http://schemas.openxmlformats.org/officeDocument/2006/relationships" xmlns:p="http://schemas.openxmlformats.org/presentationml/2006/main">
+  <p:cSld>
+    <p:spTree>
+      <p:nvGrpSpPr>
+        <p:cNvPr id="1" name=""/>
+        <p:cNvGrpSpPr/>
+        <p:nvPr/>
+      </p:nvGrpSpPr>
+      <p:grpSpPr>
+        <a:xfrm>
+          <a:off x="0" y="0"/>
+          <a:ext cx="0" cy="0"/>
+          <a:chOff x="0" y="0"/>
+          <a:chExt cx="0" cy="0"/>
+        </a:xfrm>
+      </p:grpSpPr>
+      <p:sp>
+        <p:nvSpPr>
+          <p:cNvPr id="2" name="Titolo 1">
+            <a:extLst>
+              <a:ext uri="{FF2B5EF4-FFF2-40B4-BE49-F238E27FC236}">
+                <a16:creationId xmlns:a16="http://schemas.microsoft.com/office/drawing/2014/main" id="{7ED17C10-5160-4D24-9C1C-8B84D953BC5D}"/>
+              </a:ext>
+            </a:extLst>
+          </p:cNvPr>
+          <p:cNvSpPr>
+            <a:spLocks noGrp="1"/>
+          </p:cNvSpPr>
+          <p:nvPr>
+            <p:ph type="title"/>
+          </p:nvPr>
+        </p:nvSpPr>
+        <p:spPr/>
+        <p:txBody>
+          <a:bodyPr/>
+          <a:lstStyle/>
+          <a:p>
+            <a:r>
+              <a:rPr lang="it-IT" dirty="0"/>
+              <a:t>Android libraries</a:t>
+            </a:r>
+          </a:p>
+        </p:txBody>
+      </p:sp>
+      <p:sp>
+        <p:nvSpPr>
+          <p:cNvPr id="3" name="Segnaposto contenuto 2">
+            <a:extLst>
+              <a:ext uri="{FF2B5EF4-FFF2-40B4-BE49-F238E27FC236}">
+                <a16:creationId xmlns:a16="http://schemas.microsoft.com/office/drawing/2014/main" id="{93EF6A8C-658C-42D9-BA88-A461BB9BA118}"/>
+              </a:ext>
+            </a:extLst>
+          </p:cNvPr>
+          <p:cNvSpPr>
+            <a:spLocks noGrp="1"/>
+          </p:cNvSpPr>
+          <p:nvPr>
+            <p:ph sz="half" idx="1"/>
+          </p:nvPr>
+        </p:nvSpPr>
+        <p:spPr/>
+        <p:txBody>
+          <a:bodyPr>
+            <a:normAutofit fontScale="25000" lnSpcReduction="20000"/>
+          </a:bodyPr>
+          <a:lstStyle/>
+          <a:p>
+            <a:r>
+              <a:rPr lang="en-US" sz="7200" dirty="0" err="1">
+                <a:solidFill>
+                  <a:srgbClr val="FF0000"/>
+                </a:solidFill>
+              </a:rPr>
+              <a:t>android.app</a:t>
+            </a:r>
+            <a:r>
+              <a:rPr lang="en-US" sz="7200" dirty="0">
+                <a:solidFill>
+                  <a:srgbClr val="FF0000"/>
+                </a:solidFill>
+              </a:rPr>
+              <a:t>: </a:t>
+            </a:r>
+            <a:r>
+              <a:rPr lang="en-US" sz="7200" dirty="0"/>
+              <a:t>Provides access to the application model and is the cornerstone of all Android applications. Contains Activity and Service two of the application core components</a:t>
+            </a:r>
+          </a:p>
+          <a:p>
+            <a:r>
+              <a:rPr lang="en-US" sz="7200" dirty="0" err="1">
+                <a:solidFill>
+                  <a:srgbClr val="FF0000"/>
+                </a:solidFill>
+              </a:rPr>
+              <a:t>android.content</a:t>
+            </a:r>
+            <a:r>
+              <a:rPr lang="en-US" sz="7200" dirty="0">
+                <a:solidFill>
+                  <a:srgbClr val="FF0000"/>
+                </a:solidFill>
+              </a:rPr>
+              <a:t>: </a:t>
+            </a:r>
+            <a:r>
+              <a:rPr lang="en-US" sz="7200" dirty="0"/>
+              <a:t>Facilitates content access, publishing and messaging between applications and application components</a:t>
+            </a:r>
+          </a:p>
+          <a:p>
+            <a:r>
+              <a:rPr lang="en-US" sz="7200" dirty="0" err="1">
+                <a:solidFill>
+                  <a:srgbClr val="FF0000"/>
+                </a:solidFill>
+              </a:rPr>
+              <a:t>android.database</a:t>
+            </a:r>
+            <a:r>
+              <a:rPr lang="en-US" sz="7200" dirty="0">
+                <a:solidFill>
+                  <a:srgbClr val="FF0000"/>
+                </a:solidFill>
+              </a:rPr>
+              <a:t>: </a:t>
+            </a:r>
+            <a:r>
+              <a:rPr lang="en-US" sz="7200" dirty="0"/>
+              <a:t>Used to access data published by content providers and includes SQLite database management classes.</a:t>
+            </a:r>
+          </a:p>
+          <a:p>
+            <a:r>
+              <a:rPr lang="en-US" sz="7200" dirty="0" err="1">
+                <a:solidFill>
+                  <a:srgbClr val="FF0000"/>
+                </a:solidFill>
+              </a:rPr>
+              <a:t>android.hardware</a:t>
+            </a:r>
+            <a:r>
+              <a:rPr lang="en-US" sz="7200" dirty="0">
+                <a:solidFill>
+                  <a:srgbClr val="FF0000"/>
+                </a:solidFill>
+              </a:rPr>
+              <a:t>: </a:t>
+            </a:r>
+            <a:r>
+              <a:rPr lang="en-US" sz="7200" dirty="0"/>
+              <a:t>Presents an API providing access to hardware such as the accelerometer and light sensor. </a:t>
+            </a:r>
+          </a:p>
+          <a:p>
+            <a:r>
+              <a:rPr lang="en-US" sz="7200" dirty="0" err="1">
+                <a:solidFill>
+                  <a:srgbClr val="FF0000"/>
+                </a:solidFill>
+              </a:rPr>
+              <a:t>android.os</a:t>
+            </a:r>
+            <a:r>
+              <a:rPr lang="en-US" sz="7200" dirty="0">
+                <a:solidFill>
+                  <a:srgbClr val="FF0000"/>
+                </a:solidFill>
+              </a:rPr>
+              <a:t>: </a:t>
+            </a:r>
+            <a:r>
+              <a:rPr lang="en-US" sz="7200" dirty="0"/>
+              <a:t>Provides applications with access to standard operating system services including messages, system services and inter-process communication.</a:t>
+            </a:r>
+          </a:p>
+          <a:p>
+            <a:endParaRPr lang="en-US" sz="2900" b="1" dirty="0"/>
+          </a:p>
+          <a:p>
+            <a:endParaRPr lang="en-US" sz="1600" dirty="0"/>
+          </a:p>
+        </p:txBody>
+      </p:sp>
+      <p:sp>
+        <p:nvSpPr>
+          <p:cNvPr id="4" name="Segnaposto contenuto 3">
+            <a:extLst>
+              <a:ext uri="{FF2B5EF4-FFF2-40B4-BE49-F238E27FC236}">
+                <a16:creationId xmlns:a16="http://schemas.microsoft.com/office/drawing/2014/main" id="{E3D9853D-E8E0-4CB4-A310-B5029BC8939E}"/>
+              </a:ext>
+            </a:extLst>
+          </p:cNvPr>
+          <p:cNvSpPr>
+            <a:spLocks noGrp="1"/>
+          </p:cNvSpPr>
+          <p:nvPr>
+            <p:ph sz="half" idx="2"/>
+          </p:nvPr>
+        </p:nvSpPr>
+        <p:spPr/>
+        <p:txBody>
+          <a:bodyPr>
+            <a:normAutofit fontScale="25000" lnSpcReduction="20000"/>
+          </a:bodyPr>
+          <a:lstStyle/>
+          <a:p>
+            <a:r>
+              <a:rPr lang="en-US" sz="7200" dirty="0" err="1">
+                <a:solidFill>
+                  <a:srgbClr val="FF0000"/>
+                </a:solidFill>
+              </a:rPr>
+              <a:t>android.media</a:t>
+            </a:r>
+            <a:r>
+              <a:rPr lang="en-US" sz="7200" dirty="0">
+                <a:solidFill>
+                  <a:srgbClr val="FF0000"/>
+                </a:solidFill>
+              </a:rPr>
+              <a:t>: </a:t>
+            </a:r>
+            <a:r>
+              <a:rPr lang="en-US" sz="7200" dirty="0"/>
+              <a:t>Provides classes to enable playback of audio and video.</a:t>
+            </a:r>
+          </a:p>
+          <a:p>
+            <a:r>
+              <a:rPr lang="en-US" sz="7200" dirty="0" err="1">
+                <a:solidFill>
+                  <a:srgbClr val="FF0000"/>
+                </a:solidFill>
+              </a:rPr>
+              <a:t>android.provider</a:t>
+            </a:r>
+            <a:r>
+              <a:rPr lang="en-US" sz="7200" dirty="0">
+                <a:solidFill>
+                  <a:srgbClr val="FF0000"/>
+                </a:solidFill>
+              </a:rPr>
+              <a:t>: </a:t>
+            </a:r>
+            <a:r>
+              <a:rPr lang="en-US" sz="7200" dirty="0"/>
+              <a:t>A set of convenience classes that provide access to standard Android content provider databases such as those maintained by the calendar and contact applications.</a:t>
+            </a:r>
+          </a:p>
+          <a:p>
+            <a:r>
+              <a:rPr lang="en-US" sz="7200" dirty="0" err="1">
+                <a:solidFill>
+                  <a:srgbClr val="FF0000"/>
+                </a:solidFill>
+              </a:rPr>
+              <a:t>android.text</a:t>
+            </a:r>
+            <a:r>
+              <a:rPr lang="en-US" sz="7200" dirty="0">
+                <a:solidFill>
+                  <a:srgbClr val="FF0000"/>
+                </a:solidFill>
+              </a:rPr>
+              <a:t>: </a:t>
+            </a:r>
+            <a:r>
+              <a:rPr lang="en-US" sz="7200" dirty="0"/>
+              <a:t>Used to render and manipulate text on a device display.</a:t>
+            </a:r>
+          </a:p>
+          <a:p>
+            <a:r>
+              <a:rPr lang="en-US" sz="7200" dirty="0" err="1">
+                <a:solidFill>
+                  <a:srgbClr val="FF0000"/>
+                </a:solidFill>
+              </a:rPr>
+              <a:t>android.widget</a:t>
+            </a:r>
+            <a:r>
+              <a:rPr lang="en-US" sz="7200" dirty="0">
+                <a:solidFill>
+                  <a:srgbClr val="FF0000"/>
+                </a:solidFill>
+              </a:rPr>
+              <a:t>: </a:t>
+            </a:r>
+            <a:r>
+              <a:rPr lang="en-US" sz="7200" dirty="0"/>
+              <a:t>A rich collection of pre-built user interface components such as buttons, labels, list views, layout managers, radio buttons etc.</a:t>
+            </a:r>
+          </a:p>
+          <a:p>
+            <a:r>
+              <a:rPr lang="en-US" sz="7200" dirty="0" err="1">
+                <a:solidFill>
+                  <a:srgbClr val="FF0000"/>
+                </a:solidFill>
+              </a:rPr>
+              <a:t>android.view</a:t>
+            </a:r>
+            <a:r>
+              <a:rPr lang="en-US" sz="7200" dirty="0">
+                <a:solidFill>
+                  <a:srgbClr val="FF0000"/>
+                </a:solidFill>
+              </a:rPr>
+              <a:t>: </a:t>
+            </a:r>
+            <a:r>
+              <a:rPr lang="en-US" sz="7200" dirty="0"/>
+              <a:t>The fundamental building blocks of application user interfaces.</a:t>
+            </a:r>
+          </a:p>
+          <a:p>
+            <a:r>
+              <a:rPr lang="en-US" sz="7200" dirty="0" err="1">
+                <a:solidFill>
+                  <a:srgbClr val="FF0000"/>
+                </a:solidFill>
+              </a:rPr>
+              <a:t>android.util</a:t>
+            </a:r>
+            <a:r>
+              <a:rPr lang="en-US" sz="7200" dirty="0">
+                <a:solidFill>
+                  <a:srgbClr val="FF0000"/>
+                </a:solidFill>
+              </a:rPr>
+              <a:t>: </a:t>
+            </a:r>
+            <a:r>
+              <a:rPr lang="en-US" sz="7200" dirty="0"/>
+              <a:t>A set of utility classes for performing tasks such as string and number conversion, XML handling and date and time manipulation.</a:t>
+            </a:r>
+          </a:p>
+          <a:p>
+            <a:endParaRPr lang="en-US" sz="6400" dirty="0"/>
+          </a:p>
+          <a:p>
+            <a:pPr marL="0" indent="0">
+              <a:buNone/>
+            </a:pPr>
+            <a:endParaRPr lang="en-US" sz="2800" dirty="0"/>
+          </a:p>
+          <a:p>
+            <a:endParaRPr lang="en-US" sz="2800" dirty="0"/>
+          </a:p>
+          <a:p>
+            <a:endParaRPr lang="en-US" sz="2800" dirty="0"/>
+          </a:p>
+          <a:p>
+            <a:endParaRPr lang="en-US" sz="2800" dirty="0"/>
+          </a:p>
+          <a:p>
+            <a:endParaRPr lang="en-US" sz="2800" dirty="0"/>
+          </a:p>
+          <a:p>
+            <a:endParaRPr lang="en-US" sz="2800" dirty="0"/>
+          </a:p>
+          <a:p>
+            <a:endParaRPr lang="en-US" sz="2800" dirty="0"/>
+          </a:p>
+          <a:p>
+            <a:endParaRPr lang="it-IT" dirty="0"/>
+          </a:p>
+        </p:txBody>
+      </p:sp>
+      <p:sp>
+        <p:nvSpPr>
+          <p:cNvPr id="5" name="Segnaposto numero diapositiva 4">
+            <a:extLst>
+              <a:ext uri="{FF2B5EF4-FFF2-40B4-BE49-F238E27FC236}">
+                <a16:creationId xmlns:a16="http://schemas.microsoft.com/office/drawing/2014/main" id="{65FE1756-1E23-49D1-8227-2D989E6A2C47}"/>
+              </a:ext>
+            </a:extLst>
+          </p:cNvPr>
+          <p:cNvSpPr>
+            <a:spLocks noGrp="1"/>
+          </p:cNvSpPr>
+          <p:nvPr>
+            <p:ph type="sldNum" sz="quarter" idx="12"/>
+          </p:nvPr>
+        </p:nvSpPr>
+        <p:spPr/>
+        <p:txBody>
+          <a:bodyPr/>
+          <a:lstStyle/>
+          <a:p>
+            <a:fld id="{D2040F39-7941-49A4-B48D-F201B18B6351}" type="slidenum">
+              <a:rPr lang="it-IT" smtClean="0"/>
+              <a:pPr/>
+              <a:t>10</a:t>
+            </a:fld>
+            <a:endParaRPr lang="it-IT" dirty="0"/>
+          </a:p>
+        </p:txBody>
+      </p:sp>
+    </p:spTree>
+    <p:extLst>
+      <p:ext uri="{BB962C8B-B14F-4D97-AF65-F5344CB8AC3E}">
+        <p14:creationId xmlns:p14="http://schemas.microsoft.com/office/powerpoint/2010/main" val="104112507"/>
       </p:ext>
     </p:extLst>
   </p:cSld>
@@ -7509,14 +8148,22 @@
           <a:p>
             <a:pPr algn="just"/>
             <a:r>
-              <a:rPr lang="en-GB" dirty="0"/>
+              <a:rPr lang="en-GB" dirty="0">
+                <a:solidFill>
+                  <a:srgbClr val="FF0000"/>
+                </a:solidFill>
+              </a:rPr>
               <a:t>Application framework to manage system services</a:t>
             </a:r>
           </a:p>
           <a:p>
             <a:pPr algn="just"/>
             <a:r>
-              <a:rPr lang="en-GB" dirty="0"/>
+              <a:rPr lang="en-GB" dirty="0">
+                <a:solidFill>
+                  <a:srgbClr val="FF0000"/>
+                </a:solidFill>
+              </a:rPr>
               <a:t>User interface framework</a:t>
             </a:r>
           </a:p>
@@ -7626,9 +8273,32 @@
         <p:spPr/>
         <p:txBody>
           <a:bodyPr>
-            <a:normAutofit fontScale="70000" lnSpcReduction="20000"/>
+            <a:normAutofit fontScale="62500" lnSpcReduction="20000"/>
           </a:bodyPr>
           <a:lstStyle/>
+          <a:p>
+            <a:pPr marL="0" indent="0">
+              <a:buNone/>
+            </a:pPr>
+            <a:r>
+              <a:rPr lang="en-US" dirty="0"/>
+              <a:t>Android is structured in the form of a software stack</a:t>
+            </a:r>
+          </a:p>
+          <a:p>
+            <a:r>
+              <a:rPr lang="en-US" dirty="0">
+                <a:solidFill>
+                  <a:srgbClr val="FF0000"/>
+                </a:solidFill>
+              </a:rPr>
+              <a:t>APPS</a:t>
+            </a:r>
+            <a:r>
+              <a:rPr lang="en-US" dirty="0"/>
+              <a:t>: where is located preinstalled apps and third part apps</a:t>
+            </a:r>
+          </a:p>
           <a:p>
             <a:r>
               <a:rPr lang="en-US" dirty="0">
@@ -7706,23 +8376,7 @@
                   <a:srgbClr val="202124"/>
                 </a:solidFill>
               </a:rPr>
-              <a:t>for a mobile </a:t>
-            </a:r>
-            <a:r>
-              <a:rPr lang="it-IT" dirty="0" err="1">
-                <a:solidFill>
-                  <a:srgbClr val="202124"/>
-                </a:solidFill>
-              </a:rPr>
-              <a:t>embedded</a:t>
-            </a:r>
-            <a:r>
-              <a:rPr lang="it-IT" dirty="0">
-                <a:solidFill>
-                  <a:srgbClr val="202124"/>
-                </a:solidFill>
-              </a:rPr>
-              <a:t> </a:t>
+              <a:t>for a mobile embedded </a:t>
             </a:r>
             <a:r>
               <a:rPr lang="it-IT" dirty="0" err="1">
@@ -7738,23 +8392,7 @@
                   <a:srgbClr val="202124"/>
                 </a:solidFill>
               </a:rPr>
-              <a:t>. In Linux </a:t>
-            </a:r>
-            <a:r>
-              <a:rPr lang="it-IT" dirty="0" err="1">
-                <a:solidFill>
-                  <a:srgbClr val="202124"/>
-                </a:solidFill>
-              </a:rPr>
-              <a:t>Kernel</a:t>
-            </a:r>
-            <a:r>
-              <a:rPr lang="it-IT" dirty="0">
-                <a:solidFill>
-                  <a:srgbClr val="202124"/>
-                </a:solidFill>
-              </a:rPr>
-              <a:t> </a:t>
+              <a:t>. In Linux Kernel </a:t>
             </a:r>
             <a:r>
               <a:rPr lang="it-IT" dirty="0" err="1">
@@ -7963,10 +8601,10 @@
       </p:grpSpPr>
       <p:sp>
         <p:nvSpPr>
-          <p:cNvPr id="2" name="Title 1">
+          <p:cNvPr id="2" name="Titolo 1">
             <a:extLst>
               <a:ext uri="{FF2B5EF4-FFF2-40B4-BE49-F238E27FC236}">
-                <a16:creationId xmlns:a16="http://schemas.microsoft.com/office/drawing/2014/main" id="{85126182-019B-E345-9D73-41B0DF525F10}"/>
+                <a16:creationId xmlns:a16="http://schemas.microsoft.com/office/drawing/2014/main" id="{2E962A39-C5AD-4FD5-867E-856E3327BE72}"/>
               </a:ext>
             </a:extLst>
           </p:cNvPr>
@@ -7983,23 +8621,18 @@
           <a:lstStyle/>
           <a:p>
             <a:r>
-              <a:rPr lang="it-IT" dirty="0" err="1"/>
-              <a:t>Android</a:t>
-            </a:r>
-            <a:r>
               <a:rPr lang="it-IT" dirty="0"/>
-              <a:t> SDK</a:t>
-            </a:r>
-            <a:endParaRPr lang="en-IT" dirty="0"/>
+              <a:t>Android Framework</a:t>
+            </a:r>
           </a:p>
         </p:txBody>
       </p:sp>
       <p:sp>
         <p:nvSpPr>
-          <p:cNvPr id="3" name="Content Placeholder 2">
+          <p:cNvPr id="3" name="Segnaposto contenuto 2">
             <a:extLst>
               <a:ext uri="{FF2B5EF4-FFF2-40B4-BE49-F238E27FC236}">
-                <a16:creationId xmlns:a16="http://schemas.microsoft.com/office/drawing/2014/main" id="{6CD44A4A-622E-7A44-9907-9D189560343A}"/>
+                <a16:creationId xmlns:a16="http://schemas.microsoft.com/office/drawing/2014/main" id="{6A5B8ABA-B84A-4959-B86C-6F5E092E505E}"/>
               </a:ext>
             </a:extLst>
           </p:cNvPr>
@@ -8013,7 +8646,7 @@
         <p:spPr/>
         <p:txBody>
           <a:bodyPr>
-            <a:normAutofit/>
+            <a:normAutofit fontScale="77500" lnSpcReduction="20000"/>
           </a:bodyPr>
           <a:lstStyle/>
           <a:p>
@@ -8021,18 +8654,17 @@
               <a:buNone/>
             </a:pPr>
             <a:r>
-              <a:rPr lang="en-US" dirty="0">
-                <a:solidFill>
-                  <a:schemeClr val="accent6">
-                    <a:lumMod val="75000"/>
-                  </a:schemeClr>
-                </a:solidFill>
-              </a:rPr>
-              <a:t>Android Software Development Kit </a:t>
-            </a:r>
-            <a:r>
               <a:rPr lang="en-US" dirty="0"/>
-              <a:t>contains the libraries and tools you need to develop Android apps</a:t>
+              <a:t>The Android Framework is a set of services that collectively form the environment in which Android applications run and are managed.</a:t>
+            </a:r>
+          </a:p>
+          <a:p>
+            <a:pPr marL="0" indent="0">
+              <a:buNone/>
+            </a:pPr>
+            <a:r>
+              <a:rPr lang="en-US" dirty="0"/>
+              <a:t>Include key services:</a:t>
             </a:r>
           </a:p>
           <a:p>
@@ -8042,29 +8674,12 @@
                   <a:srgbClr val="FF0000"/>
                 </a:solidFill>
               </a:rPr>
-              <a:t>API libraries: </a:t>
-            </a:r>
-            <a:r>
-              <a:rPr lang="it-IT" dirty="0"/>
-              <a:t>one for </a:t>
-            </a:r>
-            <a:r>
-              <a:rPr lang="it-IT" dirty="0" err="1"/>
-              <a:t>each</a:t>
-            </a:r>
-            <a:r>
-              <a:rPr lang="it-IT" dirty="0"/>
-              <a:t> Android </a:t>
-            </a:r>
-            <a:r>
-              <a:rPr lang="it-IT" dirty="0" err="1"/>
-              <a:t>version</a:t>
-            </a:r>
-            <a:endParaRPr lang="en-US" dirty="0">
-              <a:solidFill>
-                <a:srgbClr val="FF0000"/>
-              </a:solidFill>
-            </a:endParaRPr>
+              <a:t>Activity Manager: </a:t>
+            </a:r>
+            <a:r>
+              <a:rPr lang="en-US" dirty="0"/>
+              <a:t>Controls application lifecycle and activity stack.</a:t>
+            </a:r>
           </a:p>
           <a:p>
             <a:r>
@@ -8073,223 +8688,49 @@
                   <a:srgbClr val="FF0000"/>
                 </a:solidFill>
               </a:rPr>
-              <a:t>Development tools</a:t>
+              <a:t>Content Providers: </a:t>
             </a:r>
             <a:r>
               <a:rPr lang="en-US" dirty="0"/>
-              <a:t>: Android Studio IDE and other tools (</a:t>
-            </a:r>
-            <a:r>
-              <a:rPr lang="it-IT" dirty="0"/>
-              <a:t>debugger, design tools…)</a:t>
-            </a:r>
-          </a:p>
-          <a:p>
-            <a:r>
-              <a:rPr lang="it-IT" dirty="0">
+              <a:t>Allows applications to publish and share data with other applications.</a:t>
+            </a:r>
+          </a:p>
+          <a:p>
+            <a:r>
+              <a:rPr lang="en-US" dirty="0">
                 <a:solidFill>
                   <a:srgbClr val="FF0000"/>
                 </a:solidFill>
               </a:rPr>
-              <a:t>Android Virtual Device Manager</a:t>
-            </a:r>
-          </a:p>
-          <a:p>
-            <a:endParaRPr lang="en-US" dirty="0"/>
-          </a:p>
-          <a:p>
-            <a:endParaRPr lang="it-IT" dirty="0"/>
-          </a:p>
-          <a:p>
-            <a:endParaRPr lang="en-IT" dirty="0"/>
+              <a:t>Resource Manager: </a:t>
+            </a:r>
+            <a:r>
+              <a:rPr lang="en-US" dirty="0"/>
+              <a:t>Provides access to resources </a:t>
+            </a:r>
+          </a:p>
+          <a:p>
+            <a:r>
+              <a:rPr lang="en-US" dirty="0">
+                <a:solidFill>
+                  <a:srgbClr val="FF0000"/>
+                </a:solidFill>
+              </a:rPr>
+              <a:t>Notifications Manager: </a:t>
+            </a:r>
+            <a:r>
+              <a:rPr lang="en-US" dirty="0"/>
+              <a:t>Allows applications to display alerts and notifications to the user.</a:t>
+            </a:r>
           </a:p>
         </p:txBody>
       </p:sp>
       <p:sp>
         <p:nvSpPr>
-          <p:cNvPr id="4" name="Content Placeholder 3">
+          <p:cNvPr id="5" name="Segnaposto numero diapositiva 4">
             <a:extLst>
               <a:ext uri="{FF2B5EF4-FFF2-40B4-BE49-F238E27FC236}">
-                <a16:creationId xmlns:a16="http://schemas.microsoft.com/office/drawing/2014/main" id="{E4C0CD46-CC3E-4D4D-9529-58E3D8993B41}"/>
-              </a:ext>
-            </a:extLst>
-          </p:cNvPr>
-          <p:cNvSpPr>
-            <a:spLocks noGrp="1"/>
-          </p:cNvSpPr>
-          <p:nvPr>
-            <p:ph sz="half" idx="2"/>
-          </p:nvPr>
-        </p:nvSpPr>
-        <p:spPr/>
-        <p:txBody>
-          <a:bodyPr>
-            <a:normAutofit/>
-          </a:bodyPr>
-          <a:lstStyle/>
-          <a:p>
-            <a:pPr marL="0" indent="0">
-              <a:buNone/>
-            </a:pPr>
-            <a:endParaRPr lang="it-IT" dirty="0">
-              <a:solidFill>
-                <a:schemeClr val="accent6">
-                  <a:lumMod val="75000"/>
-                </a:schemeClr>
-              </a:solidFill>
-            </a:endParaRPr>
-          </a:p>
-          <a:p>
-            <a:r>
-              <a:rPr lang="it-IT" dirty="0">
-                <a:solidFill>
-                  <a:srgbClr val="FF0000"/>
-                </a:solidFill>
-              </a:rPr>
-              <a:t>Emulator: </a:t>
-            </a:r>
-            <a:r>
-              <a:rPr lang="it-IT" dirty="0" err="1"/>
-              <a:t>run</a:t>
-            </a:r>
-            <a:r>
-              <a:rPr lang="it-IT" dirty="0"/>
-              <a:t> in AVD</a:t>
-            </a:r>
-            <a:endParaRPr lang="it-IT" dirty="0">
-              <a:solidFill>
-                <a:srgbClr val="FF0000"/>
-              </a:solidFill>
-            </a:endParaRPr>
-          </a:p>
-          <a:p>
-            <a:r>
-              <a:rPr lang="it-IT" dirty="0">
-                <a:solidFill>
-                  <a:schemeClr val="accent6">
-                    <a:lumMod val="75000"/>
-                  </a:schemeClr>
-                </a:solidFill>
-              </a:rPr>
-              <a:t>Android support</a:t>
-            </a:r>
-            <a:r>
-              <a:rPr lang="it-IT" dirty="0"/>
-              <a:t>: extra </a:t>
-            </a:r>
-            <a:r>
-              <a:rPr lang="it-IT" dirty="0" err="1"/>
-              <a:t>APIs</a:t>
-            </a:r>
-            <a:r>
-              <a:rPr lang="it-IT" dirty="0"/>
-              <a:t> </a:t>
-            </a:r>
-            <a:r>
-              <a:rPr lang="it-IT" dirty="0" err="1"/>
-              <a:t>that</a:t>
-            </a:r>
-            <a:r>
-              <a:rPr lang="it-IT" dirty="0"/>
-              <a:t> </a:t>
-            </a:r>
-            <a:r>
-              <a:rPr lang="it-IT" dirty="0" err="1"/>
-              <a:t>aren’t</a:t>
-            </a:r>
-            <a:r>
-              <a:rPr lang="it-IT" dirty="0"/>
-              <a:t> </a:t>
-            </a:r>
-            <a:r>
-              <a:rPr lang="it-IT" dirty="0" err="1"/>
-              <a:t>available</a:t>
-            </a:r>
-            <a:r>
-              <a:rPr lang="it-IT" dirty="0"/>
-              <a:t> in standard </a:t>
-            </a:r>
-            <a:r>
-              <a:rPr lang="it-IT" dirty="0" err="1"/>
-              <a:t>platform</a:t>
-            </a:r>
-            <a:endParaRPr lang="it-IT" dirty="0"/>
-          </a:p>
-          <a:p>
-            <a:r>
-              <a:rPr lang="it-IT" dirty="0">
-                <a:solidFill>
-                  <a:schemeClr val="accent6">
-                    <a:lumMod val="75000"/>
-                  </a:schemeClr>
-                </a:solidFill>
-              </a:rPr>
-              <a:t>Sample apps:  </a:t>
-            </a:r>
-            <a:r>
-              <a:rPr lang="it-IT" dirty="0" err="1"/>
-              <a:t>you</a:t>
-            </a:r>
-            <a:r>
-              <a:rPr lang="it-IT" dirty="0"/>
-              <a:t> can </a:t>
-            </a:r>
-            <a:r>
-              <a:rPr lang="it-IT" dirty="0" err="1"/>
-              <a:t>find</a:t>
-            </a:r>
-            <a:r>
-              <a:rPr lang="it-IT" dirty="0"/>
-              <a:t> </a:t>
-            </a:r>
-            <a:r>
-              <a:rPr lang="it-IT" dirty="0" err="1"/>
-              <a:t>pratical</a:t>
-            </a:r>
-            <a:r>
-              <a:rPr lang="it-IT" dirty="0"/>
-              <a:t> code to help </a:t>
-            </a:r>
-            <a:r>
-              <a:rPr lang="it-IT" dirty="0" err="1"/>
-              <a:t>you</a:t>
-            </a:r>
-            <a:r>
-              <a:rPr lang="it-IT" dirty="0"/>
-              <a:t> to use </a:t>
-            </a:r>
-            <a:r>
-              <a:rPr lang="it-IT" dirty="0" err="1"/>
-              <a:t>APIs</a:t>
-            </a:r>
-            <a:endParaRPr lang="it-IT" b="1" dirty="0"/>
-          </a:p>
-          <a:p>
-            <a:endParaRPr lang="it-IT" dirty="0"/>
-          </a:p>
-          <a:p>
-            <a:endParaRPr lang="it-IT" b="1" dirty="0"/>
-          </a:p>
-          <a:p>
-            <a:endParaRPr lang="it-IT" dirty="0"/>
-          </a:p>
-          <a:p>
-            <a:endParaRPr lang="it-IT" b="1" dirty="0"/>
-          </a:p>
-          <a:p>
-            <a:endParaRPr lang="it-IT" b="1" dirty="0"/>
-          </a:p>
-          <a:p>
-            <a:endParaRPr lang="en-IT" dirty="0"/>
-          </a:p>
-        </p:txBody>
-      </p:sp>
-      <p:sp>
-        <p:nvSpPr>
-          <p:cNvPr id="5" name="Slide Number Placeholder 4">
-            <a:extLst>
-              <a:ext uri="{FF2B5EF4-FFF2-40B4-BE49-F238E27FC236}">
-                <a16:creationId xmlns:a16="http://schemas.microsoft.com/office/drawing/2014/main" id="{BAFA7AE0-1F44-CD41-AF4F-9F9B761BD502}"/>
+                <a16:creationId xmlns:a16="http://schemas.microsoft.com/office/drawing/2014/main" id="{5B618714-7057-4883-97BC-4FAC473138D9}"/>
               </a:ext>
             </a:extLst>
           </p:cNvPr>
@@ -8314,10 +8755,106 @@
           </a:p>
         </p:txBody>
       </p:sp>
+      <p:sp>
+        <p:nvSpPr>
+          <p:cNvPr id="6" name="Segnaposto contenuto 5">
+            <a:extLst>
+              <a:ext uri="{FF2B5EF4-FFF2-40B4-BE49-F238E27FC236}">
+                <a16:creationId xmlns:a16="http://schemas.microsoft.com/office/drawing/2014/main" id="{2B9996C9-7459-41DA-BF1C-7A91261E21FF}"/>
+              </a:ext>
+            </a:extLst>
+          </p:cNvPr>
+          <p:cNvSpPr>
+            <a:spLocks noGrp="1"/>
+          </p:cNvSpPr>
+          <p:nvPr>
+            <p:ph sz="half" idx="2"/>
+          </p:nvPr>
+        </p:nvSpPr>
+        <p:spPr/>
+        <p:txBody>
+          <a:bodyPr>
+            <a:normAutofit fontScale="77500" lnSpcReduction="20000"/>
+          </a:bodyPr>
+          <a:lstStyle/>
+          <a:p>
+            <a:r>
+              <a:rPr lang="en-US" dirty="0">
+                <a:solidFill>
+                  <a:srgbClr val="FF0000"/>
+                </a:solidFill>
+              </a:rPr>
+              <a:t>View System</a:t>
+            </a:r>
+            <a:r>
+              <a:rPr lang="en-US">
+                <a:solidFill>
+                  <a:srgbClr val="FF0000"/>
+                </a:solidFill>
+              </a:rPr>
+              <a:t>: </a:t>
+            </a:r>
+            <a:r>
+              <a:rPr lang="en-US"/>
+              <a:t>A set </a:t>
+            </a:r>
+            <a:r>
+              <a:rPr lang="en-US" dirty="0"/>
+              <a:t>of views used to create application user interfaces.</a:t>
+            </a:r>
+          </a:p>
+          <a:p>
+            <a:r>
+              <a:rPr lang="en-US" dirty="0">
+                <a:solidFill>
+                  <a:srgbClr val="FF0000"/>
+                </a:solidFill>
+              </a:rPr>
+              <a:t>Package Manager: </a:t>
+            </a:r>
+            <a:r>
+              <a:rPr lang="en-US" dirty="0"/>
+              <a:t>The system by which applications are able to find out information about other applications currently installed on the device.</a:t>
+            </a:r>
+          </a:p>
+          <a:p>
+            <a:r>
+              <a:rPr lang="en-US" dirty="0">
+                <a:solidFill>
+                  <a:srgbClr val="FF0000"/>
+                </a:solidFill>
+              </a:rPr>
+              <a:t>Telephony Manager: </a:t>
+            </a:r>
+            <a:r>
+              <a:rPr lang="en-US" dirty="0"/>
+              <a:t>Provides information to the application about the telephony services available on the device such as status and subscriber information.</a:t>
+            </a:r>
+          </a:p>
+          <a:p>
+            <a:r>
+              <a:rPr lang="en-US" dirty="0">
+                <a:solidFill>
+                  <a:srgbClr val="FF0000"/>
+                </a:solidFill>
+              </a:rPr>
+              <a:t>Location Manager: </a:t>
+            </a:r>
+            <a:r>
+              <a:rPr lang="en-US" dirty="0"/>
+              <a:t>Provides access to the location services allowing an application to receive updates about location changes.</a:t>
+            </a:r>
+            <a:endParaRPr lang="it-IT" dirty="0"/>
+          </a:p>
+          <a:p>
+            <a:endParaRPr lang="it-IT" dirty="0"/>
+          </a:p>
+        </p:txBody>
+      </p:sp>
     </p:spTree>
     <p:extLst>
       <p:ext uri="{BB962C8B-B14F-4D97-AF65-F5344CB8AC3E}">
-        <p14:creationId xmlns:p14="http://schemas.microsoft.com/office/powerpoint/2010/main" val="2085951726"/>
+        <p14:creationId xmlns:p14="http://schemas.microsoft.com/office/powerpoint/2010/main" val="815546248"/>
       </p:ext>
     </p:extLst>
   </p:cSld>
@@ -8398,7 +8935,7 @@
         <p:spPr/>
         <p:txBody>
           <a:bodyPr>
-            <a:normAutofit fontScale="85000" lnSpcReduction="20000"/>
+            <a:normAutofit fontScale="92500"/>
           </a:bodyPr>
           <a:lstStyle/>
           <a:p>
@@ -8466,73 +9003,8 @@
             </a:r>
             <a:r>
               <a:rPr lang="it-IT" dirty="0"/>
-              <a:t> formats. For </a:t>
-            </a:r>
-            <a:r>
-              <a:rPr lang="it-IT" dirty="0" err="1"/>
-              <a:t>this</a:t>
-            </a:r>
-            <a:r>
-              <a:rPr lang="it-IT" dirty="0"/>
-              <a:t> </a:t>
-            </a:r>
-            <a:r>
-              <a:rPr lang="it-IT" dirty="0" err="1"/>
-              <a:t>reason</a:t>
-            </a:r>
-            <a:r>
-              <a:rPr lang="it-IT" dirty="0"/>
-              <a:t> </a:t>
-            </a:r>
-            <a:r>
-              <a:rPr lang="it-IT" dirty="0" err="1"/>
-              <a:t>you</a:t>
-            </a:r>
-            <a:r>
-              <a:rPr lang="it-IT" dirty="0"/>
-              <a:t> </a:t>
-            </a:r>
-            <a:r>
-              <a:rPr lang="it-IT" dirty="0" err="1"/>
-              <a:t>have</a:t>
-            </a:r>
-            <a:r>
-              <a:rPr lang="it-IT" dirty="0"/>
-              <a:t> to use Android SDK, </a:t>
-            </a:r>
-            <a:r>
-              <a:rPr lang="it-IT" dirty="0" err="1"/>
-              <a:t>that</a:t>
-            </a:r>
-            <a:r>
-              <a:rPr lang="it-IT" dirty="0"/>
-              <a:t> include tools to </a:t>
-            </a:r>
-            <a:r>
-              <a:rPr lang="it-IT" dirty="0" err="1"/>
-              <a:t>convert</a:t>
-            </a:r>
-            <a:r>
-              <a:rPr lang="it-IT" dirty="0"/>
-              <a:t> java </a:t>
-            </a:r>
-            <a:r>
-              <a:rPr lang="it-IT" dirty="0" err="1"/>
-              <a:t>compiled</a:t>
-            </a:r>
-            <a:r>
-              <a:rPr lang="it-IT" dirty="0"/>
-              <a:t> code </a:t>
-            </a:r>
-            <a:r>
-              <a:rPr lang="it-IT" dirty="0" err="1"/>
-              <a:t>into</a:t>
-            </a:r>
-            <a:r>
-              <a:rPr lang="it-IT" dirty="0"/>
-              <a:t> Android format</a:t>
-            </a:r>
-            <a:endParaRPr lang="en-US" dirty="0"/>
+              <a:t> formats. </a:t>
+            </a:r>
           </a:p>
           <a:p>
             <a:r>
@@ -8724,6 +9196,389 @@
     <p:extLst>
       <p:ext uri="{BB962C8B-B14F-4D97-AF65-F5344CB8AC3E}">
         <p14:creationId xmlns:p14="http://schemas.microsoft.com/office/powerpoint/2010/main" val="3196813027"/>
+      </p:ext>
+    </p:extLst>
+  </p:cSld>
+  <p:clrMapOvr>
+    <a:masterClrMapping/>
+  </p:clrMapOvr>
+</p:sld>
+</file>
+
+<file path=ppt/slides/slide9.xml><?xml version="1.0" encoding="utf-8"?>
+<p:sld xmlns:a="http://schemas.openxmlformats.org/drawingml/2006/main" xmlns:r="http://schemas.openxmlformats.org/officeDocument/2006/relationships" xmlns:p="http://schemas.openxmlformats.org/presentationml/2006/main">
+  <p:cSld>
+    <p:spTree>
+      <p:nvGrpSpPr>
+        <p:cNvPr id="1" name=""/>
+        <p:cNvGrpSpPr/>
+        <p:nvPr/>
+      </p:nvGrpSpPr>
+      <p:grpSpPr>
+        <a:xfrm>
+          <a:off x="0" y="0"/>
+          <a:ext cx="0" cy="0"/>
+          <a:chOff x="0" y="0"/>
+          <a:chExt cx="0" cy="0"/>
+        </a:xfrm>
+      </p:grpSpPr>
+      <p:sp>
+        <p:nvSpPr>
+          <p:cNvPr id="2" name="Title 1">
+            <a:extLst>
+              <a:ext uri="{FF2B5EF4-FFF2-40B4-BE49-F238E27FC236}">
+                <a16:creationId xmlns:a16="http://schemas.microsoft.com/office/drawing/2014/main" id="{85126182-019B-E345-9D73-41B0DF525F10}"/>
+              </a:ext>
+            </a:extLst>
+          </p:cNvPr>
+          <p:cNvSpPr>
+            <a:spLocks noGrp="1"/>
+          </p:cNvSpPr>
+          <p:nvPr>
+            <p:ph type="title"/>
+          </p:nvPr>
+        </p:nvSpPr>
+        <p:spPr/>
+        <p:txBody>
+          <a:bodyPr/>
+          <a:lstStyle/>
+          <a:p>
+            <a:r>
+              <a:rPr lang="it-IT" dirty="0" err="1"/>
+              <a:t>Android</a:t>
+            </a:r>
+            <a:r>
+              <a:rPr lang="it-IT" dirty="0"/>
+              <a:t> SDK</a:t>
+            </a:r>
+            <a:endParaRPr lang="en-IT" dirty="0"/>
+          </a:p>
+        </p:txBody>
+      </p:sp>
+      <p:sp>
+        <p:nvSpPr>
+          <p:cNvPr id="3" name="Content Placeholder 2">
+            <a:extLst>
+              <a:ext uri="{FF2B5EF4-FFF2-40B4-BE49-F238E27FC236}">
+                <a16:creationId xmlns:a16="http://schemas.microsoft.com/office/drawing/2014/main" id="{6CD44A4A-622E-7A44-9907-9D189560343A}"/>
+              </a:ext>
+            </a:extLst>
+          </p:cNvPr>
+          <p:cNvSpPr>
+            <a:spLocks noGrp="1"/>
+          </p:cNvSpPr>
+          <p:nvPr>
+            <p:ph sz="half" idx="1"/>
+          </p:nvPr>
+        </p:nvSpPr>
+        <p:spPr/>
+        <p:txBody>
+          <a:bodyPr>
+            <a:normAutofit/>
+          </a:bodyPr>
+          <a:lstStyle/>
+          <a:p>
+            <a:pPr marL="0" indent="0">
+              <a:buNone/>
+            </a:pPr>
+            <a:r>
+              <a:rPr lang="en-US" dirty="0">
+                <a:solidFill>
+                  <a:schemeClr val="accent6">
+                    <a:lumMod val="75000"/>
+                  </a:schemeClr>
+                </a:solidFill>
+              </a:rPr>
+              <a:t>Android Software Development Kit </a:t>
+            </a:r>
+            <a:r>
+              <a:rPr lang="en-US" dirty="0"/>
+              <a:t>contains the libraries and tools you need to develop Android apps</a:t>
+            </a:r>
+          </a:p>
+          <a:p>
+            <a:r>
+              <a:rPr lang="en-US" dirty="0">
+                <a:solidFill>
+                  <a:srgbClr val="FF0000"/>
+                </a:solidFill>
+              </a:rPr>
+              <a:t>API libraries: </a:t>
+            </a:r>
+            <a:r>
+              <a:rPr lang="it-IT" dirty="0"/>
+              <a:t>one for </a:t>
+            </a:r>
+            <a:r>
+              <a:rPr lang="it-IT" dirty="0" err="1"/>
+              <a:t>each</a:t>
+            </a:r>
+            <a:r>
+              <a:rPr lang="it-IT" dirty="0"/>
+              <a:t> Android </a:t>
+            </a:r>
+            <a:r>
+              <a:rPr lang="it-IT" dirty="0" err="1"/>
+              <a:t>version</a:t>
+            </a:r>
+            <a:endParaRPr lang="en-US" dirty="0">
+              <a:solidFill>
+                <a:srgbClr val="FF0000"/>
+              </a:solidFill>
+            </a:endParaRPr>
+          </a:p>
+          <a:p>
+            <a:r>
+              <a:rPr lang="en-US" dirty="0">
+                <a:solidFill>
+                  <a:srgbClr val="FF0000"/>
+                </a:solidFill>
+              </a:rPr>
+              <a:t>Development tools</a:t>
+            </a:r>
+            <a:r>
+              <a:rPr lang="en-US" dirty="0"/>
+              <a:t>: Android Studio IDE and other tools (</a:t>
+            </a:r>
+            <a:r>
+              <a:rPr lang="it-IT" dirty="0"/>
+              <a:t>debugger, design tools…)</a:t>
+            </a:r>
+          </a:p>
+          <a:p>
+            <a:r>
+              <a:rPr lang="it-IT" dirty="0">
+                <a:solidFill>
+                  <a:srgbClr val="FF0000"/>
+                </a:solidFill>
+              </a:rPr>
+              <a:t>Android Virtual Device Manager</a:t>
+            </a:r>
+          </a:p>
+          <a:p>
+            <a:endParaRPr lang="en-US" dirty="0"/>
+          </a:p>
+          <a:p>
+            <a:endParaRPr lang="it-IT" dirty="0"/>
+          </a:p>
+          <a:p>
+            <a:endParaRPr lang="en-IT" dirty="0"/>
+          </a:p>
+        </p:txBody>
+      </p:sp>
+      <p:sp>
+        <p:nvSpPr>
+          <p:cNvPr id="4" name="Content Placeholder 3">
+            <a:extLst>
+              <a:ext uri="{FF2B5EF4-FFF2-40B4-BE49-F238E27FC236}">
+                <a16:creationId xmlns:a16="http://schemas.microsoft.com/office/drawing/2014/main" id="{E4C0CD46-CC3E-4D4D-9529-58E3D8993B41}"/>
+              </a:ext>
+            </a:extLst>
+          </p:cNvPr>
+          <p:cNvSpPr>
+            <a:spLocks noGrp="1"/>
+          </p:cNvSpPr>
+          <p:nvPr>
+            <p:ph sz="half" idx="2"/>
+          </p:nvPr>
+        </p:nvSpPr>
+        <p:spPr/>
+        <p:txBody>
+          <a:bodyPr>
+            <a:normAutofit/>
+          </a:bodyPr>
+          <a:lstStyle/>
+          <a:p>
+            <a:pPr marL="0" indent="0">
+              <a:buNone/>
+            </a:pPr>
+            <a:endParaRPr lang="it-IT" dirty="0">
+              <a:solidFill>
+                <a:schemeClr val="accent6">
+                  <a:lumMod val="75000"/>
+                </a:schemeClr>
+              </a:solidFill>
+            </a:endParaRPr>
+          </a:p>
+          <a:p>
+            <a:r>
+              <a:rPr lang="it-IT" dirty="0">
+                <a:solidFill>
+                  <a:srgbClr val="FF0000"/>
+                </a:solidFill>
+              </a:rPr>
+              <a:t>Emulator: </a:t>
+            </a:r>
+            <a:r>
+              <a:rPr lang="it-IT" dirty="0" err="1"/>
+              <a:t>run</a:t>
+            </a:r>
+            <a:r>
+              <a:rPr lang="it-IT" dirty="0"/>
+              <a:t> in AVD</a:t>
+            </a:r>
+            <a:endParaRPr lang="it-IT" dirty="0">
+              <a:solidFill>
+                <a:srgbClr val="FF0000"/>
+              </a:solidFill>
+            </a:endParaRPr>
+          </a:p>
+          <a:p>
+            <a:r>
+              <a:rPr lang="it-IT" dirty="0">
+                <a:solidFill>
+                  <a:schemeClr val="accent6">
+                    <a:lumMod val="75000"/>
+                  </a:schemeClr>
+                </a:solidFill>
+              </a:rPr>
+              <a:t>Android support</a:t>
+            </a:r>
+            <a:r>
+              <a:rPr lang="it-IT" dirty="0"/>
+              <a:t>: extra </a:t>
+            </a:r>
+            <a:r>
+              <a:rPr lang="it-IT" dirty="0" err="1"/>
+              <a:t>APIs</a:t>
+            </a:r>
+            <a:r>
+              <a:rPr lang="it-IT" dirty="0"/>
+              <a:t> </a:t>
+            </a:r>
+            <a:r>
+              <a:rPr lang="it-IT" dirty="0" err="1"/>
+              <a:t>that</a:t>
+            </a:r>
+            <a:r>
+              <a:rPr lang="it-IT" dirty="0"/>
+              <a:t> </a:t>
+            </a:r>
+            <a:r>
+              <a:rPr lang="it-IT" dirty="0" err="1"/>
+              <a:t>aren’t</a:t>
+            </a:r>
+            <a:r>
+              <a:rPr lang="it-IT" dirty="0"/>
+              <a:t> </a:t>
+            </a:r>
+            <a:r>
+              <a:rPr lang="it-IT" dirty="0" err="1"/>
+              <a:t>available</a:t>
+            </a:r>
+            <a:r>
+              <a:rPr lang="it-IT" dirty="0"/>
+              <a:t> in standard </a:t>
+            </a:r>
+            <a:r>
+              <a:rPr lang="it-IT" dirty="0" err="1"/>
+              <a:t>platform</a:t>
+            </a:r>
+            <a:endParaRPr lang="it-IT" dirty="0"/>
+          </a:p>
+          <a:p>
+            <a:r>
+              <a:rPr lang="it-IT" dirty="0">
+                <a:solidFill>
+                  <a:schemeClr val="accent6">
+                    <a:lumMod val="75000"/>
+                  </a:schemeClr>
+                </a:solidFill>
+              </a:rPr>
+              <a:t>Sample apps:  </a:t>
+            </a:r>
+            <a:r>
+              <a:rPr lang="it-IT" dirty="0" err="1"/>
+              <a:t>you</a:t>
+            </a:r>
+            <a:r>
+              <a:rPr lang="it-IT" dirty="0"/>
+              <a:t> can </a:t>
+            </a:r>
+            <a:r>
+              <a:rPr lang="it-IT" dirty="0" err="1"/>
+              <a:t>find</a:t>
+            </a:r>
+            <a:r>
+              <a:rPr lang="it-IT" dirty="0"/>
+              <a:t> </a:t>
+            </a:r>
+            <a:r>
+              <a:rPr lang="it-IT" dirty="0" err="1"/>
+              <a:t>pratical</a:t>
+            </a:r>
+            <a:r>
+              <a:rPr lang="it-IT" dirty="0"/>
+              <a:t> code to help </a:t>
+            </a:r>
+            <a:r>
+              <a:rPr lang="it-IT" dirty="0" err="1"/>
+              <a:t>you</a:t>
+            </a:r>
+            <a:r>
+              <a:rPr lang="it-IT" dirty="0"/>
+              <a:t> to use </a:t>
+            </a:r>
+            <a:r>
+              <a:rPr lang="it-IT" dirty="0" err="1"/>
+              <a:t>APIs</a:t>
+            </a:r>
+            <a:endParaRPr lang="it-IT" b="1" dirty="0"/>
+          </a:p>
+          <a:p>
+            <a:endParaRPr lang="it-IT" dirty="0"/>
+          </a:p>
+          <a:p>
+            <a:endParaRPr lang="it-IT" b="1" dirty="0"/>
+          </a:p>
+          <a:p>
+            <a:endParaRPr lang="it-IT" dirty="0"/>
+          </a:p>
+          <a:p>
+            <a:endParaRPr lang="it-IT" b="1" dirty="0"/>
+          </a:p>
+          <a:p>
+            <a:endParaRPr lang="it-IT" b="1" dirty="0"/>
+          </a:p>
+          <a:p>
+            <a:endParaRPr lang="en-IT" dirty="0"/>
+          </a:p>
+        </p:txBody>
+      </p:sp>
+      <p:sp>
+        <p:nvSpPr>
+          <p:cNvPr id="5" name="Slide Number Placeholder 4">
+            <a:extLst>
+              <a:ext uri="{FF2B5EF4-FFF2-40B4-BE49-F238E27FC236}">
+                <a16:creationId xmlns:a16="http://schemas.microsoft.com/office/drawing/2014/main" id="{BAFA7AE0-1F44-CD41-AF4F-9F9B761BD502}"/>
+              </a:ext>
+            </a:extLst>
+          </p:cNvPr>
+          <p:cNvSpPr>
+            <a:spLocks noGrp="1"/>
+          </p:cNvSpPr>
+          <p:nvPr>
+            <p:ph type="sldNum" sz="quarter" idx="12"/>
+          </p:nvPr>
+        </p:nvSpPr>
+        <p:spPr/>
+        <p:txBody>
+          <a:bodyPr/>
+          <a:lstStyle/>
+          <a:p>
+            <a:fld id="{D2040F39-7941-49A4-B48D-F201B18B6351}" type="slidenum">
+              <a:rPr lang="it-IT" smtClean="0"/>
+              <a:pPr/>
+              <a:t>9</a:t>
+            </a:fld>
+            <a:endParaRPr lang="it-IT" dirty="0"/>
+          </a:p>
+        </p:txBody>
+      </p:sp>
+    </p:spTree>
+    <p:extLst>
+      <p:ext uri="{BB962C8B-B14F-4D97-AF65-F5344CB8AC3E}">
+        <p14:creationId xmlns:p14="http://schemas.microsoft.com/office/powerpoint/2010/main" val="2085951726"/>
       </p:ext>
     </p:extLst>
   </p:cSld>

</xml_diff>

<commit_message>
M1 -> COMPLETED (add android libraries)
</commit_message>
<xml_diff>
--- a/slides/01 - Android Introduction.pptx
+++ b/slides/01 - Android Introduction.pptx
@@ -145,7 +145,7 @@
   <pc:docChgLst>
     <pc:chgData name="KEVIN MALAGOLI" userId="4753276f-5182-4cb6-86cf-6602de7c63db" providerId="ADAL" clId="{45976A04-9547-49A1-98B8-D239308FE1AF}"/>
     <pc:docChg chg="undo custSel addSld delSld modSld sldOrd">
-      <pc:chgData name="KEVIN MALAGOLI" userId="4753276f-5182-4cb6-86cf-6602de7c63db" providerId="ADAL" clId="{45976A04-9547-49A1-98B8-D239308FE1AF}" dt="2021-12-29T16:21:53.586" v="1089" actId="20577"/>
+      <pc:chgData name="KEVIN MALAGOLI" userId="4753276f-5182-4cb6-86cf-6602de7c63db" providerId="ADAL" clId="{45976A04-9547-49A1-98B8-D239308FE1AF}" dt="2021-12-31T12:46:19.435" v="1096" actId="207"/>
       <pc:docMkLst>
         <pc:docMk/>
       </pc:docMkLst>
@@ -165,7 +165,7 @@
         </pc:spChg>
       </pc:sldChg>
       <pc:sldChg chg="addSp delSp modSp mod modClrScheme chgLayout">
-        <pc:chgData name="KEVIN MALAGOLI" userId="4753276f-5182-4cb6-86cf-6602de7c63db" providerId="ADAL" clId="{45976A04-9547-49A1-98B8-D239308FE1AF}" dt="2021-12-29T14:12:14.634" v="265" actId="700"/>
+        <pc:chgData name="KEVIN MALAGOLI" userId="4753276f-5182-4cb6-86cf-6602de7c63db" providerId="ADAL" clId="{45976A04-9547-49A1-98B8-D239308FE1AF}" dt="2021-12-31T12:45:23.450" v="1094" actId="207"/>
         <pc:sldMkLst>
           <pc:docMk/>
           <pc:sldMk cId="1670668431" sldId="265"/>
@@ -179,7 +179,7 @@
           </ac:spMkLst>
         </pc:spChg>
         <pc:spChg chg="mod ord">
-          <ac:chgData name="KEVIN MALAGOLI" userId="4753276f-5182-4cb6-86cf-6602de7c63db" providerId="ADAL" clId="{45976A04-9547-49A1-98B8-D239308FE1AF}" dt="2021-12-29T14:12:14.634" v="265" actId="700"/>
+          <ac:chgData name="KEVIN MALAGOLI" userId="4753276f-5182-4cb6-86cf-6602de7c63db" providerId="ADAL" clId="{45976A04-9547-49A1-98B8-D239308FE1AF}" dt="2021-12-31T12:45:23.450" v="1094" actId="207"/>
           <ac:spMkLst>
             <pc:docMk/>
             <pc:sldMk cId="1670668431" sldId="265"/>
@@ -220,13 +220,13 @@
         </pc:picChg>
       </pc:sldChg>
       <pc:sldChg chg="modSp mod ord">
-        <pc:chgData name="KEVIN MALAGOLI" userId="4753276f-5182-4cb6-86cf-6602de7c63db" providerId="ADAL" clId="{45976A04-9547-49A1-98B8-D239308FE1AF}" dt="2021-12-29T16:20:34.420" v="1068"/>
+        <pc:chgData name="KEVIN MALAGOLI" userId="4753276f-5182-4cb6-86cf-6602de7c63db" providerId="ADAL" clId="{45976A04-9547-49A1-98B8-D239308FE1AF}" dt="2021-12-31T12:46:01.512" v="1095" actId="207"/>
         <pc:sldMkLst>
           <pc:docMk/>
           <pc:sldMk cId="3196813027" sldId="270"/>
         </pc:sldMkLst>
         <pc:spChg chg="mod">
-          <ac:chgData name="KEVIN MALAGOLI" userId="4753276f-5182-4cb6-86cf-6602de7c63db" providerId="ADAL" clId="{45976A04-9547-49A1-98B8-D239308FE1AF}" dt="2021-12-29T16:02:34.920" v="910" actId="27636"/>
+          <ac:chgData name="KEVIN MALAGOLI" userId="4753276f-5182-4cb6-86cf-6602de7c63db" providerId="ADAL" clId="{45976A04-9547-49A1-98B8-D239308FE1AF}" dt="2021-12-31T12:46:01.512" v="1095" actId="207"/>
           <ac:spMkLst>
             <pc:docMk/>
             <pc:sldMk cId="3196813027" sldId="270"/>
@@ -234,12 +234,28 @@
           </ac:spMkLst>
         </pc:spChg>
       </pc:sldChg>
-      <pc:sldChg chg="ord">
-        <pc:chgData name="KEVIN MALAGOLI" userId="4753276f-5182-4cb6-86cf-6602de7c63db" providerId="ADAL" clId="{45976A04-9547-49A1-98B8-D239308FE1AF}" dt="2021-12-29T16:19:55.575" v="1064"/>
+      <pc:sldChg chg="modSp mod ord">
+        <pc:chgData name="KEVIN MALAGOLI" userId="4753276f-5182-4cb6-86cf-6602de7c63db" providerId="ADAL" clId="{45976A04-9547-49A1-98B8-D239308FE1AF}" dt="2021-12-31T12:46:19.435" v="1096" actId="207"/>
         <pc:sldMkLst>
           <pc:docMk/>
           <pc:sldMk cId="2085951726" sldId="271"/>
         </pc:sldMkLst>
+        <pc:spChg chg="mod">
+          <ac:chgData name="KEVIN MALAGOLI" userId="4753276f-5182-4cb6-86cf-6602de7c63db" providerId="ADAL" clId="{45976A04-9547-49A1-98B8-D239308FE1AF}" dt="2021-12-31T12:46:19.435" v="1096" actId="207"/>
+          <ac:spMkLst>
+            <pc:docMk/>
+            <pc:sldMk cId="2085951726" sldId="271"/>
+            <ac:spMk id="3" creationId="{6CD44A4A-622E-7A44-9907-9D189560343A}"/>
+          </ac:spMkLst>
+        </pc:spChg>
+        <pc:spChg chg="mod">
+          <ac:chgData name="KEVIN MALAGOLI" userId="4753276f-5182-4cb6-86cf-6602de7c63db" providerId="ADAL" clId="{45976A04-9547-49A1-98B8-D239308FE1AF}" dt="2021-12-31T12:46:19.435" v="1096" actId="207"/>
+          <ac:spMkLst>
+            <pc:docMk/>
+            <pc:sldMk cId="2085951726" sldId="271"/>
+            <ac:spMk id="4" creationId="{E4C0CD46-CC3E-4D4D-9529-58E3D8993B41}"/>
+          </ac:spMkLst>
+        </pc:spChg>
       </pc:sldChg>
       <pc:sldChg chg="addSp delSp modSp new mod ord">
         <pc:chgData name="KEVIN MALAGOLI" userId="4753276f-5182-4cb6-86cf-6602de7c63db" providerId="ADAL" clId="{45976A04-9547-49A1-98B8-D239308FE1AF}" dt="2021-12-29T16:21:53.586" v="1089" actId="20577"/>
@@ -8292,52 +8308,46 @@
                   <a:srgbClr val="FF0000"/>
                 </a:solidFill>
               </a:rPr>
-              <a:t>APPS</a:t>
+              <a:t>APPS: </a:t>
             </a:r>
             <a:r>
               <a:rPr lang="en-US" dirty="0"/>
-              <a:t>: where is located preinstalled apps and third part apps</a:t>
+              <a:t>where is located preinstalled apps and third part apps</a:t>
             </a:r>
           </a:p>
           <a:p>
             <a:r>
               <a:rPr lang="en-US" dirty="0">
                 <a:solidFill>
-                  <a:schemeClr val="accent6">
-                    <a:lumMod val="75000"/>
-                  </a:schemeClr>
+                  <a:srgbClr val="FF0000"/>
                 </a:solidFill>
               </a:rPr>
-              <a:t>ANDROID FRAMEWORK</a:t>
+              <a:t>ANDROID FRAMEWORK:</a:t>
             </a:r>
             <a:r>
               <a:rPr lang="en-US" dirty="0"/>
-              <a:t>: When you develop android app you use Android Framework, which offer an interface for native languages libraries (Java, C++).</a:t>
+              <a:t> When you develop android app you use Android Framework, which offer an interface for native languages libraries (Java, C++).</a:t>
             </a:r>
           </a:p>
           <a:p>
             <a:r>
               <a:rPr lang="en-US" dirty="0">
                 <a:solidFill>
-                  <a:schemeClr val="accent6">
-                    <a:lumMod val="75000"/>
-                  </a:schemeClr>
+                  <a:srgbClr val="FF0000"/>
                 </a:solidFill>
               </a:rPr>
-              <a:t>ANDROID RUNTIME</a:t>
+              <a:t>ANDROID RUNTIME: </a:t>
             </a:r>
             <a:r>
               <a:rPr lang="en-US" dirty="0"/>
-              <a:t>: is the android “virtual machine”. Core Libraries is a set of classes which are used by SDK and included functionality near the android VM</a:t>
+              <a:t>is the android “virtual machine”. Core Libraries is a set of classes which are used by SDK and included functionality near the android VM</a:t>
             </a:r>
           </a:p>
           <a:p>
             <a:r>
               <a:rPr lang="en-US" dirty="0">
                 <a:solidFill>
-                  <a:schemeClr val="accent6">
-                    <a:lumMod val="75000"/>
-                  </a:schemeClr>
+                  <a:srgbClr val="FF0000"/>
                 </a:solidFill>
               </a:rPr>
               <a:t>HAL</a:t>
@@ -8351,16 +8361,10 @@
             <a:r>
               <a:rPr lang="en-US" dirty="0">
                 <a:solidFill>
-                  <a:schemeClr val="accent6">
-                    <a:lumMod val="75000"/>
-                  </a:schemeClr>
+                  <a:srgbClr val="FF0000"/>
                 </a:solidFill>
               </a:rPr>
-              <a:t>LINUX KERNEL</a:t>
-            </a:r>
-            <a:r>
-              <a:rPr lang="en-US" dirty="0"/>
-              <a:t>: </a:t>
+              <a:t>LINUX KERNEL: </a:t>
             </a:r>
             <a:r>
               <a:rPr lang="en-US" dirty="0">
@@ -9010,9 +9014,7 @@
             <a:r>
               <a:rPr lang="en-US" dirty="0">
                 <a:solidFill>
-                  <a:schemeClr val="accent6">
-                    <a:lumMod val="75000"/>
-                  </a:schemeClr>
+                  <a:srgbClr val="FF0000"/>
                 </a:solidFill>
               </a:rPr>
               <a:t>Android uses DEX Compiler </a:t>
@@ -9284,9 +9286,7 @@
             <a:r>
               <a:rPr lang="en-US" dirty="0">
                 <a:solidFill>
-                  <a:schemeClr val="accent6">
-                    <a:lumMod val="75000"/>
-                  </a:schemeClr>
+                  <a:srgbClr val="FF0000"/>
                 </a:solidFill>
               </a:rPr>
               <a:t>Android Software Development Kit </a:t>
@@ -9334,11 +9334,11 @@
                   <a:srgbClr val="FF0000"/>
                 </a:solidFill>
               </a:rPr>
-              <a:t>Development tools</a:t>
+              <a:t>Development tools: </a:t>
             </a:r>
             <a:r>
               <a:rPr lang="en-US" dirty="0"/>
-              <a:t>: Android Studio IDE and other tools (</a:t>
+              <a:t>Android Studio IDE and other tools (</a:t>
             </a:r>
             <a:r>
               <a:rPr lang="it-IT" dirty="0"/>
@@ -9427,16 +9427,14 @@
             <a:r>
               <a:rPr lang="it-IT" dirty="0">
                 <a:solidFill>
-                  <a:schemeClr val="accent6">
-                    <a:lumMod val="75000"/>
-                  </a:schemeClr>
+                  <a:srgbClr val="FF0000"/>
                 </a:solidFill>
               </a:rPr>
-              <a:t>Android support</a:t>
+              <a:t>Android support: </a:t>
             </a:r>
             <a:r>
               <a:rPr lang="it-IT" dirty="0"/>
-              <a:t>: extra </a:t>
+              <a:t>extra </a:t>
             </a:r>
             <a:r>
               <a:rPr lang="it-IT" dirty="0" err="1"/>
@@ -9480,9 +9478,7 @@
             <a:r>
               <a:rPr lang="it-IT" dirty="0">
                 <a:solidFill>
-                  <a:schemeClr val="accent6">
-                    <a:lumMod val="75000"/>
-                  </a:schemeClr>
+                  <a:srgbClr val="FF0000"/>
                 </a:solidFill>
               </a:rPr>
               <a:t>Sample apps:  </a:t>

</xml_diff>